<commit_message>
Prepared slides for GFS
</commit_message>
<xml_diff>
--- a/Presentation/DistributedFileSystems_Daniel.pptx
+++ b/Presentation/DistributedFileSystems_Daniel.pptx
@@ -13,9 +13,9 @@
     <p:sldId id="257" r:id="rId4"/>
     <p:sldId id="258" r:id="rId5"/>
     <p:sldId id="259" r:id="rId6"/>
-    <p:sldId id="260" r:id="rId7"/>
-    <p:sldId id="261" r:id="rId8"/>
-    <p:sldId id="262" r:id="rId9"/>
+    <p:sldId id="262" r:id="rId7"/>
+    <p:sldId id="260" r:id="rId8"/>
+    <p:sldId id="268" r:id="rId9"/>
     <p:sldId id="263" r:id="rId10"/>
     <p:sldId id="264" r:id="rId11"/>
     <p:sldId id="265" r:id="rId12"/>
@@ -1138,7 +1138,7 @@
     </p:spTree>
     <p:extLst>
       <p:ext uri="{BB962C8B-B14F-4D97-AF65-F5344CB8AC3E}">
-        <p14:creationId xmlns:p14="http://schemas.microsoft.com/office/powerpoint/2010/main" val="3570817664"/>
+        <p14:creationId xmlns:p14="http://schemas.microsoft.com/office/powerpoint/2010/main" val="3360599392"/>
       </p:ext>
     </p:extLst>
   </p:cSld>
@@ -1222,7 +1222,7 @@
     </p:spTree>
     <p:extLst>
       <p:ext uri="{BB962C8B-B14F-4D97-AF65-F5344CB8AC3E}">
-        <p14:creationId xmlns:p14="http://schemas.microsoft.com/office/powerpoint/2010/main" val="174957884"/>
+        <p14:creationId xmlns:p14="http://schemas.microsoft.com/office/powerpoint/2010/main" val="3570817664"/>
       </p:ext>
     </p:extLst>
   </p:cSld>
@@ -1306,7 +1306,7 @@
     </p:spTree>
     <p:extLst>
       <p:ext uri="{BB962C8B-B14F-4D97-AF65-F5344CB8AC3E}">
-        <p14:creationId xmlns:p14="http://schemas.microsoft.com/office/powerpoint/2010/main" val="3360599392"/>
+        <p14:creationId xmlns:p14="http://schemas.microsoft.com/office/powerpoint/2010/main" val="2813280591"/>
       </p:ext>
     </p:extLst>
   </p:cSld>
@@ -4512,11 +4512,7 @@
             </a:r>
             <a:r>
               <a:rPr lang="de-DE" b="1" dirty="0" smtClean="0"/>
-              <a:t>vs</a:t>
-            </a:r>
-            <a:r>
-              <a:rPr lang="de-DE" b="1" dirty="0" smtClean="0"/>
-              <a:t>. </a:t>
+              <a:t>vs. </a:t>
             </a:r>
             <a:r>
               <a:rPr lang="de-DE" dirty="0" smtClean="0">
@@ -5180,6 +5176,13 @@
   <p:clrMapOvr>
     <a:masterClrMapping/>
   </p:clrMapOvr>
+  <p:timing>
+    <p:tnLst>
+      <p:par>
+        <p:cTn id="1" dur="indefinite" restart="never" nodeType="tmRoot"/>
+      </p:par>
+    </p:tnLst>
+  </p:timing>
 </p:sld>
 </file>
 
@@ -5528,11 +5531,7 @@
             </a:r>
             <a:r>
               <a:rPr lang="de-DE" dirty="0" smtClean="0"/>
-              <a:t>- </a:t>
-            </a:r>
-            <a:r>
-              <a:rPr lang="de-DE" dirty="0" smtClean="0"/>
-              <a:t>Workflow</a:t>
+              <a:t>- Workflow</a:t>
             </a:r>
             <a:endParaRPr lang="de-DE" dirty="0"/>
           </a:p>
@@ -5844,7 +5843,7 @@
             </a:r>
             <a:r>
               <a:rPr lang="de-DE" dirty="0" err="1" smtClean="0"/>
-              <a:t>Architecture</a:t>
+              <a:t>Purpose</a:t>
             </a:r>
             <a:endParaRPr lang="de-DE" dirty="0"/>
           </a:p>
@@ -5865,6 +5864,272 @@
           <a:bodyPr/>
           <a:lstStyle/>
           <a:p>
+            <a:r>
+              <a:rPr lang="de-DE" dirty="0" err="1" smtClean="0"/>
+              <a:t>Designed</a:t>
+            </a:r>
+            <a:r>
+              <a:rPr lang="de-DE" dirty="0" smtClean="0"/>
+              <a:t> </a:t>
+            </a:r>
+            <a:r>
+              <a:rPr lang="de-DE" dirty="0" err="1" smtClean="0"/>
+              <a:t>for</a:t>
+            </a:r>
+            <a:r>
+              <a:rPr lang="de-DE" dirty="0" smtClean="0"/>
+              <a:t> </a:t>
+            </a:r>
+            <a:r>
+              <a:rPr lang="de-DE" dirty="0" err="1" smtClean="0"/>
+              <a:t>environment</a:t>
+            </a:r>
+            <a:r>
+              <a:rPr lang="de-DE" dirty="0" smtClean="0"/>
+              <a:t> </a:t>
+            </a:r>
+            <a:r>
+              <a:rPr lang="de-DE" dirty="0" err="1" smtClean="0"/>
+              <a:t>where</a:t>
+            </a:r>
+            <a:endParaRPr lang="de-DE" dirty="0" smtClean="0"/>
+          </a:p>
+          <a:p>
+            <a:pPr lvl="1"/>
+            <a:r>
+              <a:rPr lang="de-DE" dirty="0" err="1" smtClean="0"/>
+              <a:t>Component</a:t>
+            </a:r>
+            <a:r>
+              <a:rPr lang="de-DE" dirty="0" smtClean="0"/>
+              <a:t> </a:t>
+            </a:r>
+            <a:r>
+              <a:rPr lang="de-DE" dirty="0" err="1" smtClean="0"/>
+              <a:t>failures</a:t>
+            </a:r>
+            <a:r>
+              <a:rPr lang="de-DE" dirty="0" smtClean="0"/>
+              <a:t> </a:t>
+            </a:r>
+            <a:r>
+              <a:rPr lang="de-DE" dirty="0" err="1" smtClean="0"/>
+              <a:t>are</a:t>
+            </a:r>
+            <a:r>
+              <a:rPr lang="de-DE" dirty="0" smtClean="0"/>
+              <a:t> </a:t>
+            </a:r>
+            <a:r>
+              <a:rPr lang="de-DE" dirty="0" err="1" smtClean="0"/>
+              <a:t>the</a:t>
+            </a:r>
+            <a:r>
+              <a:rPr lang="de-DE" dirty="0" smtClean="0"/>
+              <a:t> norm</a:t>
+            </a:r>
+          </a:p>
+          <a:p>
+            <a:pPr lvl="1"/>
+            <a:r>
+              <a:rPr lang="de-DE" dirty="0" smtClean="0"/>
+              <a:t>Files </a:t>
+            </a:r>
+            <a:r>
+              <a:rPr lang="de-DE" dirty="0" err="1" smtClean="0"/>
+              <a:t>are</a:t>
+            </a:r>
+            <a:r>
+              <a:rPr lang="de-DE" dirty="0" smtClean="0"/>
+              <a:t> </a:t>
+            </a:r>
+            <a:r>
+              <a:rPr lang="de-DE" dirty="0" err="1" smtClean="0"/>
+              <a:t>huge</a:t>
+            </a:r>
+            <a:r>
+              <a:rPr lang="de-DE" dirty="0" smtClean="0"/>
+              <a:t> (100MB </a:t>
+            </a:r>
+            <a:r>
+              <a:rPr lang="de-DE" dirty="0" err="1" smtClean="0"/>
+              <a:t>and</a:t>
+            </a:r>
+            <a:r>
+              <a:rPr lang="de-DE" dirty="0" smtClean="0"/>
+              <a:t> </a:t>
+            </a:r>
+            <a:r>
+              <a:rPr lang="de-DE" dirty="0" err="1" smtClean="0"/>
+              <a:t>more</a:t>
+            </a:r>
+            <a:r>
+              <a:rPr lang="de-DE" dirty="0" smtClean="0"/>
+              <a:t>)</a:t>
+            </a:r>
+          </a:p>
+          <a:p>
+            <a:pPr lvl="1"/>
+            <a:r>
+              <a:rPr lang="de-DE" dirty="0" smtClean="0"/>
+              <a:t>Files </a:t>
+            </a:r>
+            <a:r>
+              <a:rPr lang="de-DE" dirty="0" err="1" smtClean="0"/>
+              <a:t>usually</a:t>
+            </a:r>
+            <a:r>
+              <a:rPr lang="de-DE" dirty="0" smtClean="0"/>
+              <a:t> do not </a:t>
+            </a:r>
+            <a:r>
+              <a:rPr lang="de-DE" dirty="0" err="1" smtClean="0"/>
+              <a:t>change</a:t>
+            </a:r>
+            <a:r>
+              <a:rPr lang="de-DE" dirty="0" smtClean="0"/>
+              <a:t> (</a:t>
+            </a:r>
+            <a:r>
+              <a:rPr lang="de-DE" dirty="0" err="1" smtClean="0"/>
+              <a:t>written</a:t>
+            </a:r>
+            <a:r>
+              <a:rPr lang="de-DE" dirty="0" smtClean="0"/>
+              <a:t> </a:t>
+            </a:r>
+            <a:r>
+              <a:rPr lang="de-DE" dirty="0" err="1" smtClean="0"/>
+              <a:t>once</a:t>
+            </a:r>
+            <a:r>
+              <a:rPr lang="de-DE" dirty="0"/>
+              <a:t>)</a:t>
+            </a:r>
+            <a:endParaRPr lang="de-DE" dirty="0" smtClean="0"/>
+          </a:p>
+          <a:p>
+            <a:pPr lvl="1"/>
+            <a:r>
+              <a:rPr lang="de-DE" dirty="0" err="1" smtClean="0"/>
+              <a:t>If</a:t>
+            </a:r>
+            <a:r>
+              <a:rPr lang="de-DE" dirty="0" smtClean="0"/>
+              <a:t> </a:t>
+            </a:r>
+            <a:r>
+              <a:rPr lang="de-DE" dirty="0" err="1" smtClean="0"/>
+              <a:t>they</a:t>
+            </a:r>
+            <a:r>
+              <a:rPr lang="de-DE" dirty="0" smtClean="0"/>
+              <a:t> </a:t>
+            </a:r>
+            <a:r>
+              <a:rPr lang="de-DE" dirty="0" err="1" smtClean="0"/>
+              <a:t>change</a:t>
+            </a:r>
+            <a:r>
+              <a:rPr lang="de-DE" dirty="0" smtClean="0"/>
+              <a:t>, </a:t>
+            </a:r>
+            <a:r>
+              <a:rPr lang="de-DE" dirty="0" err="1" smtClean="0"/>
+              <a:t>changes</a:t>
+            </a:r>
+            <a:r>
+              <a:rPr lang="de-DE" dirty="0" smtClean="0"/>
+              <a:t> </a:t>
+            </a:r>
+            <a:r>
+              <a:rPr lang="de-DE" dirty="0" err="1" smtClean="0"/>
+              <a:t>are</a:t>
+            </a:r>
+            <a:r>
+              <a:rPr lang="de-DE" dirty="0" smtClean="0"/>
+              <a:t> </a:t>
+            </a:r>
+            <a:r>
+              <a:rPr lang="de-DE" dirty="0" err="1" smtClean="0"/>
+              <a:t>appended</a:t>
+            </a:r>
+            <a:endParaRPr lang="de-DE" dirty="0" smtClean="0"/>
+          </a:p>
+          <a:p>
+            <a:pPr lvl="1"/>
+            <a:r>
+              <a:rPr lang="de-DE" dirty="0" smtClean="0"/>
+              <a:t>Files </a:t>
+            </a:r>
+            <a:r>
+              <a:rPr lang="de-DE" dirty="0" err="1" smtClean="0"/>
+              <a:t>are</a:t>
+            </a:r>
+            <a:r>
+              <a:rPr lang="de-DE" dirty="0" smtClean="0"/>
+              <a:t> </a:t>
+            </a:r>
+            <a:r>
+              <a:rPr lang="de-DE" dirty="0" err="1" smtClean="0"/>
+              <a:t>mostly</a:t>
+            </a:r>
+            <a:r>
+              <a:rPr lang="de-DE" dirty="0" smtClean="0"/>
+              <a:t> </a:t>
+            </a:r>
+            <a:r>
+              <a:rPr lang="de-DE" dirty="0" err="1" smtClean="0"/>
+              <a:t>read</a:t>
+            </a:r>
+            <a:r>
+              <a:rPr lang="de-DE" dirty="0" smtClean="0"/>
+              <a:t> </a:t>
+            </a:r>
+            <a:r>
+              <a:rPr lang="de-DE" dirty="0" err="1" smtClean="0"/>
+              <a:t>sequentially</a:t>
+            </a:r>
+            <a:endParaRPr lang="de-DE" dirty="0" smtClean="0"/>
+          </a:p>
+          <a:p>
+            <a:pPr lvl="1"/>
+            <a:r>
+              <a:rPr lang="de-DE" dirty="0" smtClean="0"/>
+              <a:t>High </a:t>
+            </a:r>
+            <a:r>
+              <a:rPr lang="de-DE" dirty="0" err="1" smtClean="0"/>
+              <a:t>data</a:t>
+            </a:r>
+            <a:r>
+              <a:rPr lang="de-DE" dirty="0" smtClean="0"/>
+              <a:t> </a:t>
+            </a:r>
+            <a:r>
+              <a:rPr lang="de-DE" dirty="0" err="1" smtClean="0"/>
+              <a:t>throughput</a:t>
+            </a:r>
+            <a:r>
+              <a:rPr lang="de-DE" dirty="0"/>
+              <a:t> </a:t>
+            </a:r>
+            <a:r>
+              <a:rPr lang="de-DE" dirty="0" err="1" smtClean="0"/>
+              <a:t>is</a:t>
+            </a:r>
+            <a:r>
+              <a:rPr lang="de-DE" dirty="0" smtClean="0"/>
+              <a:t> </a:t>
+            </a:r>
+            <a:r>
+              <a:rPr lang="de-DE" dirty="0" err="1" smtClean="0"/>
+              <a:t>important</a:t>
+            </a:r>
+            <a:endParaRPr lang="de-DE" dirty="0"/>
+          </a:p>
+          <a:p>
+            <a:pPr lvl="1"/>
             <a:endParaRPr lang="de-DE" dirty="0"/>
           </a:p>
         </p:txBody>
@@ -5924,7 +6189,7 @@
     </p:spTree>
     <p:extLst>
       <p:ext uri="{BB962C8B-B14F-4D97-AF65-F5344CB8AC3E}">
-        <p14:creationId xmlns:p14="http://schemas.microsoft.com/office/powerpoint/2010/main" val="4071564657"/>
+        <p14:creationId xmlns:p14="http://schemas.microsoft.com/office/powerpoint/2010/main" val="4157981273"/>
       </p:ext>
     </p:extLst>
   </p:cSld>
@@ -6002,31 +6267,45 @@
             </a:r>
             <a:r>
               <a:rPr lang="de-DE" dirty="0" smtClean="0"/>
-              <a:t>- Workflow</a:t>
+              <a:t>- </a:t>
+            </a:r>
+            <a:r>
+              <a:rPr lang="de-DE" dirty="0" err="1" smtClean="0"/>
+              <a:t>Architecture</a:t>
             </a:r>
             <a:endParaRPr lang="de-DE" dirty="0"/>
           </a:p>
         </p:txBody>
       </p:sp>
-      <p:sp>
-        <p:nvSpPr>
-          <p:cNvPr id="3" name="Inhaltsplatzhalter 2"/>
-          <p:cNvSpPr>
-            <a:spLocks noGrp="1"/>
-          </p:cNvSpPr>
+      <p:pic>
+        <p:nvPicPr>
+          <p:cNvPr id="6" name="Inhaltsplatzhalter 5"/>
+          <p:cNvPicPr>
+            <a:picLocks noGrp="1" noChangeAspect="1"/>
+          </p:cNvPicPr>
           <p:nvPr>
             <p:ph idx="1"/>
           </p:nvPr>
-        </p:nvSpPr>
-        <p:spPr/>
-        <p:txBody>
-          <a:bodyPr/>
-          <a:lstStyle/>
-          <a:p>
-            <a:endParaRPr lang="de-DE" dirty="0"/>
-          </a:p>
-        </p:txBody>
-      </p:sp>
+        </p:nvPicPr>
+        <p:blipFill>
+          <a:blip r:embed="rId3">
+            <a:extLst>
+              <a:ext uri="{28A0092B-C50C-407E-A947-70E740481C1C}">
+                <a14:useLocalDpi xmlns:a14="http://schemas.microsoft.com/office/drawing/2010/main" val="0"/>
+              </a:ext>
+            </a:extLst>
+          </a:blip>
+          <a:stretch>
+            <a:fillRect/>
+          </a:stretch>
+        </p:blipFill>
+        <p:spPr>
+          <a:xfrm>
+            <a:off x="3084575" y="5460024"/>
+            <a:ext cx="609600" cy="609600"/>
+          </a:xfrm>
+        </p:spPr>
+      </p:pic>
       <p:sp>
         <p:nvSpPr>
           <p:cNvPr id="4" name="Fußzeilenplatzhalter 3"/>
@@ -6079,10 +6358,690 @@
           </a:p>
         </p:txBody>
       </p:sp>
+      <p:pic>
+        <p:nvPicPr>
+          <p:cNvPr id="10" name="Grafik 9"/>
+          <p:cNvPicPr>
+            <a:picLocks noChangeAspect="1"/>
+          </p:cNvPicPr>
+          <p:nvPr/>
+        </p:nvPicPr>
+        <p:blipFill>
+          <a:blip r:embed="rId4">
+            <a:extLst>
+              <a:ext uri="{28A0092B-C50C-407E-A947-70E740481C1C}">
+                <a14:useLocalDpi xmlns:a14="http://schemas.microsoft.com/office/drawing/2010/main" val="0"/>
+              </a:ext>
+            </a:extLst>
+          </a:blip>
+          <a:stretch>
+            <a:fillRect/>
+          </a:stretch>
+        </p:blipFill>
+        <p:spPr>
+          <a:xfrm>
+            <a:off x="1389888" y="2119261"/>
+            <a:ext cx="920496" cy="920496"/>
+          </a:xfrm>
+          <a:prstGeom prst="rect">
+            <a:avLst/>
+          </a:prstGeom>
+        </p:spPr>
+      </p:pic>
+      <p:pic>
+        <p:nvPicPr>
+          <p:cNvPr id="11" name="Grafik 10"/>
+          <p:cNvPicPr>
+            <a:picLocks noChangeAspect="1"/>
+          </p:cNvPicPr>
+          <p:nvPr/>
+        </p:nvPicPr>
+        <p:blipFill>
+          <a:blip r:embed="rId4">
+            <a:extLst>
+              <a:ext uri="{28A0092B-C50C-407E-A947-70E740481C1C}">
+                <a14:useLocalDpi xmlns:a14="http://schemas.microsoft.com/office/drawing/2010/main" val="0"/>
+              </a:ext>
+            </a:extLst>
+          </a:blip>
+          <a:stretch>
+            <a:fillRect/>
+          </a:stretch>
+        </p:blipFill>
+        <p:spPr>
+          <a:xfrm>
+            <a:off x="2929127" y="2103513"/>
+            <a:ext cx="920497" cy="920497"/>
+          </a:xfrm>
+          <a:prstGeom prst="rect">
+            <a:avLst/>
+          </a:prstGeom>
+        </p:spPr>
+      </p:pic>
+      <p:pic>
+        <p:nvPicPr>
+          <p:cNvPr id="12" name="Grafik 11"/>
+          <p:cNvPicPr>
+            <a:picLocks noChangeAspect="1"/>
+          </p:cNvPicPr>
+          <p:nvPr/>
+        </p:nvPicPr>
+        <p:blipFill>
+          <a:blip r:embed="rId4">
+            <a:extLst>
+              <a:ext uri="{28A0092B-C50C-407E-A947-70E740481C1C}">
+                <a14:useLocalDpi xmlns:a14="http://schemas.microsoft.com/office/drawing/2010/main" val="0"/>
+              </a:ext>
+            </a:extLst>
+          </a:blip>
+          <a:stretch>
+            <a:fillRect/>
+          </a:stretch>
+        </p:blipFill>
+        <p:spPr>
+          <a:xfrm>
+            <a:off x="4483608" y="2119261"/>
+            <a:ext cx="920496" cy="920496"/>
+          </a:xfrm>
+          <a:prstGeom prst="rect">
+            <a:avLst/>
+          </a:prstGeom>
+        </p:spPr>
+      </p:pic>
+      <p:pic>
+        <p:nvPicPr>
+          <p:cNvPr id="13" name="Grafik 12"/>
+          <p:cNvPicPr>
+            <a:picLocks noChangeAspect="1"/>
+          </p:cNvPicPr>
+          <p:nvPr/>
+        </p:nvPicPr>
+        <p:blipFill>
+          <a:blip r:embed="rId5">
+            <a:extLst>
+              <a:ext uri="{28A0092B-C50C-407E-A947-70E740481C1C}">
+                <a14:useLocalDpi xmlns:a14="http://schemas.microsoft.com/office/drawing/2010/main" val="0"/>
+              </a:ext>
+            </a:extLst>
+          </a:blip>
+          <a:stretch>
+            <a:fillRect/>
+          </a:stretch>
+        </p:blipFill>
+        <p:spPr>
+          <a:xfrm>
+            <a:off x="2778251" y="3412395"/>
+            <a:ext cx="1222248" cy="1222248"/>
+          </a:xfrm>
+          <a:prstGeom prst="rect">
+            <a:avLst/>
+          </a:prstGeom>
+        </p:spPr>
+      </p:pic>
+      <p:sp>
+        <p:nvSpPr>
+          <p:cNvPr id="14" name="Textfeld 13"/>
+          <p:cNvSpPr txBox="1"/>
+          <p:nvPr/>
+        </p:nvSpPr>
+        <p:spPr>
+          <a:xfrm>
+            <a:off x="7339584" y="3469521"/>
+            <a:ext cx="3340608" cy="1107996"/>
+          </a:xfrm>
+          <a:prstGeom prst="rect">
+            <a:avLst/>
+          </a:prstGeom>
+          <a:noFill/>
+        </p:spPr>
+        <p:txBody>
+          <a:bodyPr wrap="square" rtlCol="0">
+            <a:spAutoFit/>
+          </a:bodyPr>
+          <a:lstStyle/>
+          <a:p>
+            <a:r>
+              <a:rPr lang="de-DE" dirty="0" smtClean="0"/>
+              <a:t>Master</a:t>
+            </a:r>
+          </a:p>
+          <a:p>
+            <a:r>
+              <a:rPr lang="de-DE" sz="1600" dirty="0" smtClean="0"/>
+              <a:t>File1: </a:t>
+            </a:r>
+            <a:r>
+              <a:rPr lang="de-DE" sz="1600" dirty="0" err="1" smtClean="0"/>
+              <a:t>chunk</a:t>
+            </a:r>
+            <a:r>
+              <a:rPr lang="de-DE" sz="1600" dirty="0" smtClean="0"/>
+              <a:t> a, </a:t>
+            </a:r>
+            <a:r>
+              <a:rPr lang="de-DE" sz="1600" dirty="0" err="1" smtClean="0"/>
+              <a:t>chunk</a:t>
+            </a:r>
+            <a:r>
+              <a:rPr lang="de-DE" sz="1600" dirty="0" smtClean="0"/>
+              <a:t> c, </a:t>
+            </a:r>
+            <a:r>
+              <a:rPr lang="de-DE" sz="1600" dirty="0" err="1" smtClean="0"/>
+              <a:t>chunk</a:t>
+            </a:r>
+            <a:r>
+              <a:rPr lang="de-DE" sz="1600" dirty="0" smtClean="0"/>
+              <a:t> d, …</a:t>
+            </a:r>
+          </a:p>
+          <a:p>
+            <a:r>
+              <a:rPr lang="de-DE" sz="1600" dirty="0" smtClean="0"/>
+              <a:t>File2: </a:t>
+            </a:r>
+            <a:r>
+              <a:rPr lang="de-DE" sz="1600" dirty="0" err="1" smtClean="0"/>
+              <a:t>chunk</a:t>
+            </a:r>
+            <a:r>
+              <a:rPr lang="de-DE" sz="1600" dirty="0" smtClean="0"/>
+              <a:t> b, </a:t>
+            </a:r>
+            <a:r>
+              <a:rPr lang="de-DE" sz="1600" dirty="0" err="1" smtClean="0"/>
+              <a:t>chunk</a:t>
+            </a:r>
+            <a:r>
+              <a:rPr lang="de-DE" sz="1600" dirty="0" smtClean="0"/>
+              <a:t> x</a:t>
+            </a:r>
+          </a:p>
+          <a:p>
+            <a:r>
+              <a:rPr lang="de-DE" sz="1600" dirty="0" smtClean="0"/>
+              <a:t>…</a:t>
+            </a:r>
+            <a:endParaRPr lang="de-DE" sz="1600" dirty="0"/>
+          </a:p>
+        </p:txBody>
+      </p:sp>
+      <p:sp>
+        <p:nvSpPr>
+          <p:cNvPr id="15" name="Textfeld 14"/>
+          <p:cNvSpPr txBox="1"/>
+          <p:nvPr/>
+        </p:nvSpPr>
+        <p:spPr>
+          <a:xfrm>
+            <a:off x="7339584" y="1761641"/>
+            <a:ext cx="2773680" cy="1631216"/>
+          </a:xfrm>
+          <a:prstGeom prst="rect">
+            <a:avLst/>
+          </a:prstGeom>
+          <a:noFill/>
+        </p:spPr>
+        <p:txBody>
+          <a:bodyPr wrap="square" rtlCol="0">
+            <a:spAutoFit/>
+          </a:bodyPr>
+          <a:lstStyle/>
+          <a:p>
+            <a:r>
+              <a:rPr lang="de-DE" dirty="0" err="1" smtClean="0"/>
+              <a:t>Chunkserver</a:t>
+            </a:r>
+            <a:endParaRPr lang="de-DE" dirty="0" smtClean="0"/>
+          </a:p>
+          <a:p>
+            <a:r>
+              <a:rPr lang="de-DE" sz="1600" dirty="0" err="1" smtClean="0"/>
+              <a:t>Chunk</a:t>
+            </a:r>
+            <a:r>
+              <a:rPr lang="de-DE" sz="1600" dirty="0" smtClean="0"/>
+              <a:t> a</a:t>
+            </a:r>
+          </a:p>
+          <a:p>
+            <a:r>
+              <a:rPr lang="de-DE" sz="1600" dirty="0" err="1" smtClean="0"/>
+              <a:t>Chunk</a:t>
+            </a:r>
+            <a:r>
+              <a:rPr lang="de-DE" sz="1600" dirty="0" smtClean="0"/>
+              <a:t> d</a:t>
+            </a:r>
+          </a:p>
+          <a:p>
+            <a:r>
+              <a:rPr lang="de-DE" sz="1600" dirty="0" err="1" smtClean="0"/>
+              <a:t>Chunk</a:t>
+            </a:r>
+            <a:r>
+              <a:rPr lang="de-DE" sz="1600" dirty="0" smtClean="0"/>
+              <a:t> k</a:t>
+            </a:r>
+          </a:p>
+          <a:p>
+            <a:r>
+              <a:rPr lang="de-DE" sz="1600" dirty="0" smtClean="0"/>
+              <a:t>…</a:t>
+            </a:r>
+          </a:p>
+          <a:p>
+            <a:endParaRPr lang="de-DE" dirty="0"/>
+          </a:p>
+        </p:txBody>
+      </p:sp>
+      <p:sp>
+        <p:nvSpPr>
+          <p:cNvPr id="16" name="Textfeld 15"/>
+          <p:cNvSpPr txBox="1"/>
+          <p:nvPr/>
+        </p:nvSpPr>
+        <p:spPr>
+          <a:xfrm>
+            <a:off x="7339584" y="5282267"/>
+            <a:ext cx="2773680" cy="369332"/>
+          </a:xfrm>
+          <a:prstGeom prst="rect">
+            <a:avLst/>
+          </a:prstGeom>
+          <a:noFill/>
+        </p:spPr>
+        <p:txBody>
+          <a:bodyPr wrap="square" rtlCol="0">
+            <a:spAutoFit/>
+          </a:bodyPr>
+          <a:lstStyle/>
+          <a:p>
+            <a:r>
+              <a:rPr lang="de-DE" dirty="0" smtClean="0"/>
+              <a:t>Client</a:t>
+            </a:r>
+            <a:endParaRPr lang="de-DE" dirty="0"/>
+          </a:p>
+        </p:txBody>
+      </p:sp>
+      <p:cxnSp>
+        <p:nvCxnSpPr>
+          <p:cNvPr id="26" name="Gewinkelte Verbindung 25"/>
+          <p:cNvCxnSpPr>
+            <a:stCxn id="13" idx="1"/>
+            <a:endCxn id="10" idx="2"/>
+          </p:cNvCxnSpPr>
+          <p:nvPr/>
+        </p:nvCxnSpPr>
+        <p:spPr>
+          <a:xfrm rot="10800000">
+            <a:off x="1850137" y="3039757"/>
+            <a:ext cx="928115" cy="983762"/>
+          </a:xfrm>
+          <a:prstGeom prst="bentConnector2">
+            <a:avLst/>
+          </a:prstGeom>
+          <a:ln>
+            <a:headEnd type="triangle"/>
+            <a:tailEnd type="triangle"/>
+          </a:ln>
+        </p:spPr>
+        <p:style>
+          <a:lnRef idx="1">
+            <a:schemeClr val="accent1"/>
+          </a:lnRef>
+          <a:fillRef idx="0">
+            <a:schemeClr val="accent1"/>
+          </a:fillRef>
+          <a:effectRef idx="0">
+            <a:schemeClr val="accent1"/>
+          </a:effectRef>
+          <a:fontRef idx="minor">
+            <a:schemeClr val="tx1"/>
+          </a:fontRef>
+        </p:style>
+      </p:cxnSp>
+      <p:cxnSp>
+        <p:nvCxnSpPr>
+          <p:cNvPr id="28" name="Gewinkelte Verbindung 27"/>
+          <p:cNvCxnSpPr>
+            <a:stCxn id="13" idx="0"/>
+            <a:endCxn id="11" idx="2"/>
+          </p:cNvCxnSpPr>
+          <p:nvPr/>
+        </p:nvCxnSpPr>
+        <p:spPr>
+          <a:xfrm rot="5400000" flipH="1" flipV="1">
+            <a:off x="3195183" y="3218203"/>
+            <a:ext cx="388385" cy="1"/>
+          </a:xfrm>
+          <a:prstGeom prst="bentConnector3">
+            <a:avLst>
+              <a:gd name="adj1" fmla="val 50000"/>
+            </a:avLst>
+          </a:prstGeom>
+          <a:ln>
+            <a:headEnd type="triangle"/>
+            <a:tailEnd type="triangle"/>
+          </a:ln>
+        </p:spPr>
+        <p:style>
+          <a:lnRef idx="1">
+            <a:schemeClr val="accent1"/>
+          </a:lnRef>
+          <a:fillRef idx="0">
+            <a:schemeClr val="accent1"/>
+          </a:fillRef>
+          <a:effectRef idx="0">
+            <a:schemeClr val="accent1"/>
+          </a:effectRef>
+          <a:fontRef idx="minor">
+            <a:schemeClr val="tx1"/>
+          </a:fontRef>
+        </p:style>
+      </p:cxnSp>
+      <p:cxnSp>
+        <p:nvCxnSpPr>
+          <p:cNvPr id="33" name="Gewinkelte Verbindung 32"/>
+          <p:cNvCxnSpPr>
+            <a:stCxn id="13" idx="3"/>
+            <a:endCxn id="12" idx="2"/>
+          </p:cNvCxnSpPr>
+          <p:nvPr/>
+        </p:nvCxnSpPr>
+        <p:spPr>
+          <a:xfrm flipV="1">
+            <a:off x="4000499" y="3039757"/>
+            <a:ext cx="943357" cy="983762"/>
+          </a:xfrm>
+          <a:prstGeom prst="bentConnector2">
+            <a:avLst/>
+          </a:prstGeom>
+          <a:ln>
+            <a:headEnd type="triangle"/>
+            <a:tailEnd type="triangle"/>
+          </a:ln>
+        </p:spPr>
+        <p:style>
+          <a:lnRef idx="1">
+            <a:schemeClr val="accent1"/>
+          </a:lnRef>
+          <a:fillRef idx="0">
+            <a:schemeClr val="accent1"/>
+          </a:fillRef>
+          <a:effectRef idx="0">
+            <a:schemeClr val="accent1"/>
+          </a:effectRef>
+          <a:fontRef idx="minor">
+            <a:schemeClr val="tx1"/>
+          </a:fontRef>
+        </p:style>
+      </p:cxnSp>
+      <p:cxnSp>
+        <p:nvCxnSpPr>
+          <p:cNvPr id="52" name="Gewinkelte Verbindung 51"/>
+          <p:cNvCxnSpPr>
+            <a:stCxn id="13" idx="2"/>
+            <a:endCxn id="6" idx="0"/>
+          </p:cNvCxnSpPr>
+          <p:nvPr/>
+        </p:nvCxnSpPr>
+        <p:spPr>
+          <a:xfrm rot="5400000">
+            <a:off x="2976685" y="5047333"/>
+            <a:ext cx="825381" cy="12700"/>
+          </a:xfrm>
+          <a:prstGeom prst="bentConnector3">
+            <a:avLst/>
+          </a:prstGeom>
+          <a:ln>
+            <a:headEnd type="triangle"/>
+            <a:tailEnd type="triangle"/>
+          </a:ln>
+        </p:spPr>
+        <p:style>
+          <a:lnRef idx="1">
+            <a:schemeClr val="accent1"/>
+          </a:lnRef>
+          <a:fillRef idx="0">
+            <a:schemeClr val="accent1"/>
+          </a:fillRef>
+          <a:effectRef idx="0">
+            <a:schemeClr val="accent1"/>
+          </a:effectRef>
+          <a:fontRef idx="minor">
+            <a:schemeClr val="tx1"/>
+          </a:fontRef>
+        </p:style>
+      </p:cxnSp>
+      <p:cxnSp>
+        <p:nvCxnSpPr>
+          <p:cNvPr id="54" name="Gewinkelte Verbindung 53"/>
+          <p:cNvCxnSpPr>
+            <a:stCxn id="6" idx="3"/>
+            <a:endCxn id="12" idx="3"/>
+          </p:cNvCxnSpPr>
+          <p:nvPr/>
+        </p:nvCxnSpPr>
+        <p:spPr>
+          <a:xfrm flipV="1">
+            <a:off x="3694175" y="2579509"/>
+            <a:ext cx="1709929" cy="3185315"/>
+          </a:xfrm>
+          <a:prstGeom prst="bentConnector3">
+            <a:avLst>
+              <a:gd name="adj1" fmla="val 109091"/>
+            </a:avLst>
+          </a:prstGeom>
+          <a:ln>
+            <a:tailEnd type="triangle"/>
+          </a:ln>
+        </p:spPr>
+        <p:style>
+          <a:lnRef idx="1">
+            <a:schemeClr val="accent1"/>
+          </a:lnRef>
+          <a:fillRef idx="0">
+            <a:schemeClr val="accent1"/>
+          </a:fillRef>
+          <a:effectRef idx="0">
+            <a:schemeClr val="accent1"/>
+          </a:effectRef>
+          <a:fontRef idx="minor">
+            <a:schemeClr val="tx1"/>
+          </a:fontRef>
+        </p:style>
+      </p:cxnSp>
+      <p:sp>
+        <p:nvSpPr>
+          <p:cNvPr id="56" name="Nach oben gebogener Pfeil 55"/>
+          <p:cNvSpPr/>
+          <p:nvPr/>
+        </p:nvSpPr>
+        <p:spPr>
+          <a:xfrm rot="16200000" flipH="1">
+            <a:off x="3222360" y="3517924"/>
+            <a:ext cx="2659909" cy="1703578"/>
+          </a:xfrm>
+          <a:prstGeom prst="bentUpArrow">
+            <a:avLst>
+              <a:gd name="adj1" fmla="val 7370"/>
+              <a:gd name="adj2" fmla="val 9440"/>
+              <a:gd name="adj3" fmla="val 14253"/>
+            </a:avLst>
+          </a:prstGeom>
+        </p:spPr>
+        <p:style>
+          <a:lnRef idx="2">
+            <a:schemeClr val="accent1">
+              <a:shade val="50000"/>
+            </a:schemeClr>
+          </a:lnRef>
+          <a:fillRef idx="1">
+            <a:schemeClr val="accent1"/>
+          </a:fillRef>
+          <a:effectRef idx="0">
+            <a:schemeClr val="accent1"/>
+          </a:effectRef>
+          <a:fontRef idx="minor">
+            <a:schemeClr val="lt1"/>
+          </a:fontRef>
+        </p:style>
+        <p:txBody>
+          <a:bodyPr rtlCol="0" anchor="ctr"/>
+          <a:lstStyle/>
+          <a:p>
+            <a:pPr algn="ctr"/>
+            <a:endParaRPr lang="de-DE"/>
+          </a:p>
+        </p:txBody>
+      </p:sp>
+      <p:cxnSp>
+        <p:nvCxnSpPr>
+          <p:cNvPr id="7" name="Gerade Verbindung mit Pfeil 6"/>
+          <p:cNvCxnSpPr/>
+          <p:nvPr/>
+        </p:nvCxnSpPr>
+        <p:spPr>
+          <a:xfrm>
+            <a:off x="838200" y="5651599"/>
+            <a:ext cx="350520" cy="0"/>
+          </a:xfrm>
+          <a:prstGeom prst="straightConnector1">
+            <a:avLst/>
+          </a:prstGeom>
+          <a:ln>
+            <a:tailEnd type="triangle"/>
+          </a:ln>
+        </p:spPr>
+        <p:style>
+          <a:lnRef idx="1">
+            <a:schemeClr val="accent1"/>
+          </a:lnRef>
+          <a:fillRef idx="0">
+            <a:schemeClr val="accent1"/>
+          </a:fillRef>
+          <a:effectRef idx="0">
+            <a:schemeClr val="accent1"/>
+          </a:effectRef>
+          <a:fontRef idx="minor">
+            <a:schemeClr val="tx1"/>
+          </a:fontRef>
+        </p:style>
+      </p:cxnSp>
+      <p:sp>
+        <p:nvSpPr>
+          <p:cNvPr id="9" name="Pfeil nach rechts 8"/>
+          <p:cNvSpPr/>
+          <p:nvPr/>
+        </p:nvSpPr>
+        <p:spPr>
+          <a:xfrm>
+            <a:off x="783337" y="5814072"/>
+            <a:ext cx="451104" cy="212304"/>
+          </a:xfrm>
+          <a:prstGeom prst="rightArrow">
+            <a:avLst/>
+          </a:prstGeom>
+        </p:spPr>
+        <p:style>
+          <a:lnRef idx="2">
+            <a:schemeClr val="accent1">
+              <a:shade val="50000"/>
+            </a:schemeClr>
+          </a:lnRef>
+          <a:fillRef idx="1">
+            <a:schemeClr val="accent1"/>
+          </a:fillRef>
+          <a:effectRef idx="0">
+            <a:schemeClr val="accent1"/>
+          </a:effectRef>
+          <a:fontRef idx="minor">
+            <a:schemeClr val="lt1"/>
+          </a:fontRef>
+        </p:style>
+        <p:txBody>
+          <a:bodyPr rtlCol="0" anchor="ctr"/>
+          <a:lstStyle/>
+          <a:p>
+            <a:pPr algn="ctr"/>
+            <a:endParaRPr lang="de-DE"/>
+          </a:p>
+        </p:txBody>
+      </p:sp>
+      <p:sp>
+        <p:nvSpPr>
+          <p:cNvPr id="17" name="Textfeld 16"/>
+          <p:cNvSpPr txBox="1"/>
+          <p:nvPr/>
+        </p:nvSpPr>
+        <p:spPr>
+          <a:xfrm>
+            <a:off x="1298447" y="5475518"/>
+            <a:ext cx="1283207" cy="338554"/>
+          </a:xfrm>
+          <a:prstGeom prst="rect">
+            <a:avLst/>
+          </a:prstGeom>
+          <a:noFill/>
+        </p:spPr>
+        <p:txBody>
+          <a:bodyPr wrap="square" rtlCol="0">
+            <a:spAutoFit/>
+          </a:bodyPr>
+          <a:lstStyle/>
+          <a:p>
+            <a:r>
+              <a:rPr lang="de-DE" sz="1600" dirty="0" smtClean="0"/>
+              <a:t>Control </a:t>
+            </a:r>
+            <a:r>
+              <a:rPr lang="de-DE" sz="1600" dirty="0" err="1" smtClean="0"/>
+              <a:t>flow</a:t>
+            </a:r>
+            <a:endParaRPr lang="de-DE" sz="1600" dirty="0"/>
+          </a:p>
+        </p:txBody>
+      </p:sp>
+      <p:sp>
+        <p:nvSpPr>
+          <p:cNvPr id="24" name="Textfeld 23"/>
+          <p:cNvSpPr txBox="1"/>
+          <p:nvPr/>
+        </p:nvSpPr>
+        <p:spPr>
+          <a:xfrm>
+            <a:off x="1289304" y="5773742"/>
+            <a:ext cx="1283207" cy="338554"/>
+          </a:xfrm>
+          <a:prstGeom prst="rect">
+            <a:avLst/>
+          </a:prstGeom>
+          <a:noFill/>
+        </p:spPr>
+        <p:txBody>
+          <a:bodyPr wrap="square" rtlCol="0">
+            <a:spAutoFit/>
+          </a:bodyPr>
+          <a:lstStyle/>
+          <a:p>
+            <a:r>
+              <a:rPr lang="de-DE" sz="1600" dirty="0" smtClean="0"/>
+              <a:t>Data </a:t>
+            </a:r>
+            <a:r>
+              <a:rPr lang="de-DE" sz="1600" dirty="0" err="1" smtClean="0"/>
+              <a:t>flow</a:t>
+            </a:r>
+            <a:endParaRPr lang="de-DE" sz="1600" dirty="0"/>
+          </a:p>
+        </p:txBody>
+      </p:sp>
     </p:spTree>
     <p:extLst>
       <p:ext uri="{BB962C8B-B14F-4D97-AF65-F5344CB8AC3E}">
-        <p14:creationId xmlns:p14="http://schemas.microsoft.com/office/powerpoint/2010/main" val="2025899756"/>
+        <p14:creationId xmlns:p14="http://schemas.microsoft.com/office/powerpoint/2010/main" val="4071564657"/>
       </p:ext>
     </p:extLst>
   </p:cSld>
@@ -6092,9 +7051,581 @@
   <p:timing>
     <p:tnLst>
       <p:par>
-        <p:cTn id="1" dur="indefinite" restart="never" nodeType="tmRoot"/>
+        <p:cTn id="1" dur="indefinite" restart="never" nodeType="tmRoot">
+          <p:childTnLst>
+            <p:seq concurrent="1" nextAc="seek">
+              <p:cTn id="2" dur="indefinite" nodeType="mainSeq">
+                <p:childTnLst>
+                  <p:par>
+                    <p:cTn id="3" fill="hold">
+                      <p:stCondLst>
+                        <p:cond delay="indefinite"/>
+                      </p:stCondLst>
+                      <p:childTnLst>
+                        <p:par>
+                          <p:cTn id="4" fill="hold">
+                            <p:stCondLst>
+                              <p:cond delay="0"/>
+                            </p:stCondLst>
+                            <p:childTnLst>
+                              <p:par>
+                                <p:cTn id="5" presetID="1" presetClass="entr" presetSubtype="0" fill="hold" grpId="0" nodeType="clickEffect">
+                                  <p:stCondLst>
+                                    <p:cond delay="0"/>
+                                  </p:stCondLst>
+                                  <p:childTnLst>
+                                    <p:set>
+                                      <p:cBhvr>
+                                        <p:cTn id="6" dur="1" fill="hold">
+                                          <p:stCondLst>
+                                            <p:cond delay="0"/>
+                                          </p:stCondLst>
+                                        </p:cTn>
+                                        <p:tgtEl>
+                                          <p:spTgt spid="15"/>
+                                        </p:tgtEl>
+                                        <p:attrNameLst>
+                                          <p:attrName>style.visibility</p:attrName>
+                                        </p:attrNameLst>
+                                      </p:cBhvr>
+                                      <p:to>
+                                        <p:strVal val="visible"/>
+                                      </p:to>
+                                    </p:set>
+                                  </p:childTnLst>
+                                </p:cTn>
+                              </p:par>
+                              <p:par>
+                                <p:cTn id="7" presetID="1" presetClass="entr" presetSubtype="0" fill="hold" nodeType="withEffect">
+                                  <p:stCondLst>
+                                    <p:cond delay="0"/>
+                                  </p:stCondLst>
+                                  <p:childTnLst>
+                                    <p:set>
+                                      <p:cBhvr>
+                                        <p:cTn id="8" dur="1" fill="hold">
+                                          <p:stCondLst>
+                                            <p:cond delay="0"/>
+                                          </p:stCondLst>
+                                        </p:cTn>
+                                        <p:tgtEl>
+                                          <p:spTgt spid="10"/>
+                                        </p:tgtEl>
+                                        <p:attrNameLst>
+                                          <p:attrName>style.visibility</p:attrName>
+                                        </p:attrNameLst>
+                                      </p:cBhvr>
+                                      <p:to>
+                                        <p:strVal val="visible"/>
+                                      </p:to>
+                                    </p:set>
+                                  </p:childTnLst>
+                                </p:cTn>
+                              </p:par>
+                              <p:par>
+                                <p:cTn id="9" presetID="1" presetClass="entr" presetSubtype="0" fill="hold" nodeType="withEffect">
+                                  <p:stCondLst>
+                                    <p:cond delay="0"/>
+                                  </p:stCondLst>
+                                  <p:childTnLst>
+                                    <p:set>
+                                      <p:cBhvr>
+                                        <p:cTn id="10" dur="1" fill="hold">
+                                          <p:stCondLst>
+                                            <p:cond delay="0"/>
+                                          </p:stCondLst>
+                                        </p:cTn>
+                                        <p:tgtEl>
+                                          <p:spTgt spid="11"/>
+                                        </p:tgtEl>
+                                        <p:attrNameLst>
+                                          <p:attrName>style.visibility</p:attrName>
+                                        </p:attrNameLst>
+                                      </p:cBhvr>
+                                      <p:to>
+                                        <p:strVal val="visible"/>
+                                      </p:to>
+                                    </p:set>
+                                  </p:childTnLst>
+                                </p:cTn>
+                              </p:par>
+                              <p:par>
+                                <p:cTn id="11" presetID="1" presetClass="entr" presetSubtype="0" fill="hold" nodeType="withEffect">
+                                  <p:stCondLst>
+                                    <p:cond delay="0"/>
+                                  </p:stCondLst>
+                                  <p:childTnLst>
+                                    <p:set>
+                                      <p:cBhvr>
+                                        <p:cTn id="12" dur="1" fill="hold">
+                                          <p:stCondLst>
+                                            <p:cond delay="0"/>
+                                          </p:stCondLst>
+                                        </p:cTn>
+                                        <p:tgtEl>
+                                          <p:spTgt spid="12"/>
+                                        </p:tgtEl>
+                                        <p:attrNameLst>
+                                          <p:attrName>style.visibility</p:attrName>
+                                        </p:attrNameLst>
+                                      </p:cBhvr>
+                                      <p:to>
+                                        <p:strVal val="visible"/>
+                                      </p:to>
+                                    </p:set>
+                                  </p:childTnLst>
+                                </p:cTn>
+                              </p:par>
+                            </p:childTnLst>
+                          </p:cTn>
+                        </p:par>
+                      </p:childTnLst>
+                    </p:cTn>
+                  </p:par>
+                  <p:par>
+                    <p:cTn id="13" fill="hold">
+                      <p:stCondLst>
+                        <p:cond delay="indefinite"/>
+                      </p:stCondLst>
+                      <p:childTnLst>
+                        <p:par>
+                          <p:cTn id="14" fill="hold">
+                            <p:stCondLst>
+                              <p:cond delay="0"/>
+                            </p:stCondLst>
+                            <p:childTnLst>
+                              <p:par>
+                                <p:cTn id="15" presetID="1" presetClass="entr" presetSubtype="0" fill="hold" nodeType="clickEffect">
+                                  <p:stCondLst>
+                                    <p:cond delay="0"/>
+                                  </p:stCondLst>
+                                  <p:childTnLst>
+                                    <p:set>
+                                      <p:cBhvr>
+                                        <p:cTn id="16" dur="1" fill="hold">
+                                          <p:stCondLst>
+                                            <p:cond delay="0"/>
+                                          </p:stCondLst>
+                                        </p:cTn>
+                                        <p:tgtEl>
+                                          <p:spTgt spid="13"/>
+                                        </p:tgtEl>
+                                        <p:attrNameLst>
+                                          <p:attrName>style.visibility</p:attrName>
+                                        </p:attrNameLst>
+                                      </p:cBhvr>
+                                      <p:to>
+                                        <p:strVal val="visible"/>
+                                      </p:to>
+                                    </p:set>
+                                  </p:childTnLst>
+                                </p:cTn>
+                              </p:par>
+                              <p:par>
+                                <p:cTn id="17" presetID="1" presetClass="entr" presetSubtype="0" fill="hold" grpId="0" nodeType="withEffect">
+                                  <p:stCondLst>
+                                    <p:cond delay="0"/>
+                                  </p:stCondLst>
+                                  <p:childTnLst>
+                                    <p:set>
+                                      <p:cBhvr>
+                                        <p:cTn id="18" dur="1" fill="hold">
+                                          <p:stCondLst>
+                                            <p:cond delay="0"/>
+                                          </p:stCondLst>
+                                        </p:cTn>
+                                        <p:tgtEl>
+                                          <p:spTgt spid="14"/>
+                                        </p:tgtEl>
+                                        <p:attrNameLst>
+                                          <p:attrName>style.visibility</p:attrName>
+                                        </p:attrNameLst>
+                                      </p:cBhvr>
+                                      <p:to>
+                                        <p:strVal val="visible"/>
+                                      </p:to>
+                                    </p:set>
+                                  </p:childTnLst>
+                                </p:cTn>
+                              </p:par>
+                              <p:par>
+                                <p:cTn id="19" presetID="1" presetClass="entr" presetSubtype="0" fill="hold" nodeType="withEffect">
+                                  <p:stCondLst>
+                                    <p:cond delay="0"/>
+                                  </p:stCondLst>
+                                  <p:childTnLst>
+                                    <p:set>
+                                      <p:cBhvr>
+                                        <p:cTn id="20" dur="1" fill="hold">
+                                          <p:stCondLst>
+                                            <p:cond delay="0"/>
+                                          </p:stCondLst>
+                                        </p:cTn>
+                                        <p:tgtEl>
+                                          <p:spTgt spid="26"/>
+                                        </p:tgtEl>
+                                        <p:attrNameLst>
+                                          <p:attrName>style.visibility</p:attrName>
+                                        </p:attrNameLst>
+                                      </p:cBhvr>
+                                      <p:to>
+                                        <p:strVal val="visible"/>
+                                      </p:to>
+                                    </p:set>
+                                  </p:childTnLst>
+                                </p:cTn>
+                              </p:par>
+                              <p:par>
+                                <p:cTn id="21" presetID="1" presetClass="entr" presetSubtype="0" fill="hold" nodeType="withEffect">
+                                  <p:stCondLst>
+                                    <p:cond delay="0"/>
+                                  </p:stCondLst>
+                                  <p:childTnLst>
+                                    <p:set>
+                                      <p:cBhvr>
+                                        <p:cTn id="22" dur="1" fill="hold">
+                                          <p:stCondLst>
+                                            <p:cond delay="0"/>
+                                          </p:stCondLst>
+                                        </p:cTn>
+                                        <p:tgtEl>
+                                          <p:spTgt spid="33"/>
+                                        </p:tgtEl>
+                                        <p:attrNameLst>
+                                          <p:attrName>style.visibility</p:attrName>
+                                        </p:attrNameLst>
+                                      </p:cBhvr>
+                                      <p:to>
+                                        <p:strVal val="visible"/>
+                                      </p:to>
+                                    </p:set>
+                                  </p:childTnLst>
+                                </p:cTn>
+                              </p:par>
+                              <p:par>
+                                <p:cTn id="23" presetID="1" presetClass="entr" presetSubtype="0" fill="hold" nodeType="withEffect">
+                                  <p:stCondLst>
+                                    <p:cond delay="0"/>
+                                  </p:stCondLst>
+                                  <p:childTnLst>
+                                    <p:set>
+                                      <p:cBhvr>
+                                        <p:cTn id="24" dur="1" fill="hold">
+                                          <p:stCondLst>
+                                            <p:cond delay="0"/>
+                                          </p:stCondLst>
+                                        </p:cTn>
+                                        <p:tgtEl>
+                                          <p:spTgt spid="28"/>
+                                        </p:tgtEl>
+                                        <p:attrNameLst>
+                                          <p:attrName>style.visibility</p:attrName>
+                                        </p:attrNameLst>
+                                      </p:cBhvr>
+                                      <p:to>
+                                        <p:strVal val="visible"/>
+                                      </p:to>
+                                    </p:set>
+                                  </p:childTnLst>
+                                </p:cTn>
+                              </p:par>
+                              <p:par>
+                                <p:cTn id="25" presetID="1" presetClass="entr" presetSubtype="0" fill="hold" nodeType="withEffect">
+                                  <p:stCondLst>
+                                    <p:cond delay="0"/>
+                                  </p:stCondLst>
+                                  <p:childTnLst>
+                                    <p:set>
+                                      <p:cBhvr>
+                                        <p:cTn id="26" dur="1" fill="hold">
+                                          <p:stCondLst>
+                                            <p:cond delay="0"/>
+                                          </p:stCondLst>
+                                        </p:cTn>
+                                        <p:tgtEl>
+                                          <p:spTgt spid="7"/>
+                                        </p:tgtEl>
+                                        <p:attrNameLst>
+                                          <p:attrName>style.visibility</p:attrName>
+                                        </p:attrNameLst>
+                                      </p:cBhvr>
+                                      <p:to>
+                                        <p:strVal val="visible"/>
+                                      </p:to>
+                                    </p:set>
+                                  </p:childTnLst>
+                                </p:cTn>
+                              </p:par>
+                              <p:par>
+                                <p:cTn id="27" presetID="1" presetClass="entr" presetSubtype="0" fill="hold" grpId="0" nodeType="withEffect">
+                                  <p:stCondLst>
+                                    <p:cond delay="0"/>
+                                  </p:stCondLst>
+                                  <p:childTnLst>
+                                    <p:set>
+                                      <p:cBhvr>
+                                        <p:cTn id="28" dur="1" fill="hold">
+                                          <p:stCondLst>
+                                            <p:cond delay="0"/>
+                                          </p:stCondLst>
+                                        </p:cTn>
+                                        <p:tgtEl>
+                                          <p:spTgt spid="17"/>
+                                        </p:tgtEl>
+                                        <p:attrNameLst>
+                                          <p:attrName>style.visibility</p:attrName>
+                                        </p:attrNameLst>
+                                      </p:cBhvr>
+                                      <p:to>
+                                        <p:strVal val="visible"/>
+                                      </p:to>
+                                    </p:set>
+                                  </p:childTnLst>
+                                </p:cTn>
+                              </p:par>
+                            </p:childTnLst>
+                          </p:cTn>
+                        </p:par>
+                      </p:childTnLst>
+                    </p:cTn>
+                  </p:par>
+                  <p:par>
+                    <p:cTn id="29" fill="hold">
+                      <p:stCondLst>
+                        <p:cond delay="indefinite"/>
+                      </p:stCondLst>
+                      <p:childTnLst>
+                        <p:par>
+                          <p:cTn id="30" fill="hold">
+                            <p:stCondLst>
+                              <p:cond delay="0"/>
+                            </p:stCondLst>
+                            <p:childTnLst>
+                              <p:par>
+                                <p:cTn id="31" presetID="1" presetClass="entr" presetSubtype="0" fill="hold" grpId="0" nodeType="clickEffect">
+                                  <p:stCondLst>
+                                    <p:cond delay="0"/>
+                                  </p:stCondLst>
+                                  <p:childTnLst>
+                                    <p:set>
+                                      <p:cBhvr>
+                                        <p:cTn id="32" dur="1" fill="hold">
+                                          <p:stCondLst>
+                                            <p:cond delay="0"/>
+                                          </p:stCondLst>
+                                        </p:cTn>
+                                        <p:tgtEl>
+                                          <p:spTgt spid="16"/>
+                                        </p:tgtEl>
+                                        <p:attrNameLst>
+                                          <p:attrName>style.visibility</p:attrName>
+                                        </p:attrNameLst>
+                                      </p:cBhvr>
+                                      <p:to>
+                                        <p:strVal val="visible"/>
+                                      </p:to>
+                                    </p:set>
+                                  </p:childTnLst>
+                                </p:cTn>
+                              </p:par>
+                              <p:par>
+                                <p:cTn id="33" presetID="1" presetClass="entr" presetSubtype="0" fill="hold" nodeType="withEffect">
+                                  <p:stCondLst>
+                                    <p:cond delay="0"/>
+                                  </p:stCondLst>
+                                  <p:childTnLst>
+                                    <p:set>
+                                      <p:cBhvr>
+                                        <p:cTn id="34" dur="1" fill="hold">
+                                          <p:stCondLst>
+                                            <p:cond delay="0"/>
+                                          </p:stCondLst>
+                                        </p:cTn>
+                                        <p:tgtEl>
+                                          <p:spTgt spid="6"/>
+                                        </p:tgtEl>
+                                        <p:attrNameLst>
+                                          <p:attrName>style.visibility</p:attrName>
+                                        </p:attrNameLst>
+                                      </p:cBhvr>
+                                      <p:to>
+                                        <p:strVal val="visible"/>
+                                      </p:to>
+                                    </p:set>
+                                  </p:childTnLst>
+                                </p:cTn>
+                              </p:par>
+                              <p:par>
+                                <p:cTn id="35" presetID="1" presetClass="entr" presetSubtype="0" fill="hold" nodeType="withEffect">
+                                  <p:stCondLst>
+                                    <p:cond delay="0"/>
+                                  </p:stCondLst>
+                                  <p:childTnLst>
+                                    <p:set>
+                                      <p:cBhvr>
+                                        <p:cTn id="36" dur="1" fill="hold">
+                                          <p:stCondLst>
+                                            <p:cond delay="0"/>
+                                          </p:stCondLst>
+                                        </p:cTn>
+                                        <p:tgtEl>
+                                          <p:spTgt spid="52"/>
+                                        </p:tgtEl>
+                                        <p:attrNameLst>
+                                          <p:attrName>style.visibility</p:attrName>
+                                        </p:attrNameLst>
+                                      </p:cBhvr>
+                                      <p:to>
+                                        <p:strVal val="visible"/>
+                                      </p:to>
+                                    </p:set>
+                                  </p:childTnLst>
+                                </p:cTn>
+                              </p:par>
+                              <p:par>
+                                <p:cTn id="37" presetID="1" presetClass="entr" presetSubtype="0" fill="hold" grpId="0" nodeType="withEffect">
+                                  <p:stCondLst>
+                                    <p:cond delay="0"/>
+                                  </p:stCondLst>
+                                  <p:childTnLst>
+                                    <p:set>
+                                      <p:cBhvr>
+                                        <p:cTn id="38" dur="1" fill="hold">
+                                          <p:stCondLst>
+                                            <p:cond delay="0"/>
+                                          </p:stCondLst>
+                                        </p:cTn>
+                                        <p:tgtEl>
+                                          <p:spTgt spid="56"/>
+                                        </p:tgtEl>
+                                        <p:attrNameLst>
+                                          <p:attrName>style.visibility</p:attrName>
+                                        </p:attrNameLst>
+                                      </p:cBhvr>
+                                      <p:to>
+                                        <p:strVal val="visible"/>
+                                      </p:to>
+                                    </p:set>
+                                  </p:childTnLst>
+                                </p:cTn>
+                              </p:par>
+                              <p:par>
+                                <p:cTn id="39" presetID="1" presetClass="entr" presetSubtype="0" fill="hold" nodeType="withEffect">
+                                  <p:stCondLst>
+                                    <p:cond delay="0"/>
+                                  </p:stCondLst>
+                                  <p:childTnLst>
+                                    <p:set>
+                                      <p:cBhvr>
+                                        <p:cTn id="40" dur="1" fill="hold">
+                                          <p:stCondLst>
+                                            <p:cond delay="0"/>
+                                          </p:stCondLst>
+                                        </p:cTn>
+                                        <p:tgtEl>
+                                          <p:spTgt spid="54"/>
+                                        </p:tgtEl>
+                                        <p:attrNameLst>
+                                          <p:attrName>style.visibility</p:attrName>
+                                        </p:attrNameLst>
+                                      </p:cBhvr>
+                                      <p:to>
+                                        <p:strVal val="visible"/>
+                                      </p:to>
+                                    </p:set>
+                                  </p:childTnLst>
+                                </p:cTn>
+                              </p:par>
+                              <p:par>
+                                <p:cTn id="41" presetID="1" presetClass="entr" presetSubtype="0" fill="hold" grpId="0" nodeType="withEffect">
+                                  <p:stCondLst>
+                                    <p:cond delay="0"/>
+                                  </p:stCondLst>
+                                  <p:childTnLst>
+                                    <p:set>
+                                      <p:cBhvr>
+                                        <p:cTn id="42" dur="1" fill="hold">
+                                          <p:stCondLst>
+                                            <p:cond delay="0"/>
+                                          </p:stCondLst>
+                                        </p:cTn>
+                                        <p:tgtEl>
+                                          <p:spTgt spid="9"/>
+                                        </p:tgtEl>
+                                        <p:attrNameLst>
+                                          <p:attrName>style.visibility</p:attrName>
+                                        </p:attrNameLst>
+                                      </p:cBhvr>
+                                      <p:to>
+                                        <p:strVal val="visible"/>
+                                      </p:to>
+                                    </p:set>
+                                  </p:childTnLst>
+                                </p:cTn>
+                              </p:par>
+                              <p:par>
+                                <p:cTn id="43" presetID="1" presetClass="entr" presetSubtype="0" fill="hold" grpId="0" nodeType="withEffect">
+                                  <p:stCondLst>
+                                    <p:cond delay="0"/>
+                                  </p:stCondLst>
+                                  <p:childTnLst>
+                                    <p:set>
+                                      <p:cBhvr>
+                                        <p:cTn id="44" dur="1" fill="hold">
+                                          <p:stCondLst>
+                                            <p:cond delay="0"/>
+                                          </p:stCondLst>
+                                        </p:cTn>
+                                        <p:tgtEl>
+                                          <p:spTgt spid="24"/>
+                                        </p:tgtEl>
+                                        <p:attrNameLst>
+                                          <p:attrName>style.visibility</p:attrName>
+                                        </p:attrNameLst>
+                                      </p:cBhvr>
+                                      <p:to>
+                                        <p:strVal val="visible"/>
+                                      </p:to>
+                                    </p:set>
+                                  </p:childTnLst>
+                                </p:cTn>
+                              </p:par>
+                            </p:childTnLst>
+                          </p:cTn>
+                        </p:par>
+                      </p:childTnLst>
+                    </p:cTn>
+                  </p:par>
+                </p:childTnLst>
+              </p:cTn>
+              <p:prevCondLst>
+                <p:cond evt="onPrev" delay="0">
+                  <p:tgtEl>
+                    <p:sldTgt/>
+                  </p:tgtEl>
+                </p:cond>
+              </p:prevCondLst>
+              <p:nextCondLst>
+                <p:cond evt="onNext" delay="0">
+                  <p:tgtEl>
+                    <p:sldTgt/>
+                  </p:tgtEl>
+                </p:cond>
+              </p:nextCondLst>
+            </p:seq>
+          </p:childTnLst>
+        </p:cTn>
       </p:par>
     </p:tnLst>
+    <p:bldLst>
+      <p:bldP spid="14" grpId="0"/>
+      <p:bldP spid="15" grpId="0"/>
+      <p:bldP spid="16" grpId="0"/>
+      <p:bldP spid="56" grpId="0" animBg="1"/>
+      <p:bldP spid="9" grpId="0" animBg="1"/>
+      <p:bldP spid="17" grpId="0"/>
+      <p:bldP spid="24" grpId="0"/>
+    </p:bldLst>
   </p:timing>
 </p:sld>
 </file>
@@ -6160,35 +7691,41 @@
             </a:r>
             <a:r>
               <a:rPr lang="de-DE" dirty="0" smtClean="0"/>
-              <a:t>- </a:t>
-            </a:r>
-            <a:r>
-              <a:rPr lang="de-DE" dirty="0" err="1" smtClean="0"/>
-              <a:t>Purpose</a:t>
+              <a:t>- Workflow</a:t>
             </a:r>
             <a:endParaRPr lang="de-DE" dirty="0"/>
           </a:p>
         </p:txBody>
       </p:sp>
-      <p:sp>
-        <p:nvSpPr>
-          <p:cNvPr id="3" name="Inhaltsplatzhalter 2"/>
-          <p:cNvSpPr>
-            <a:spLocks noGrp="1"/>
-          </p:cNvSpPr>
+      <p:pic>
+        <p:nvPicPr>
+          <p:cNvPr id="6" name="Inhaltsplatzhalter 5"/>
+          <p:cNvPicPr>
+            <a:picLocks noGrp="1" noChangeAspect="1"/>
+          </p:cNvPicPr>
           <p:nvPr>
             <p:ph idx="1"/>
           </p:nvPr>
-        </p:nvSpPr>
-        <p:spPr/>
-        <p:txBody>
-          <a:bodyPr/>
-          <a:lstStyle/>
-          <a:p>
-            <a:endParaRPr lang="de-DE" dirty="0"/>
-          </a:p>
-        </p:txBody>
-      </p:sp>
+        </p:nvPicPr>
+        <p:blipFill>
+          <a:blip r:embed="rId3">
+            <a:extLst>
+              <a:ext uri="{28A0092B-C50C-407E-A947-70E740481C1C}">
+                <a14:useLocalDpi xmlns:a14="http://schemas.microsoft.com/office/drawing/2010/main" val="0"/>
+              </a:ext>
+            </a:extLst>
+          </a:blip>
+          <a:stretch>
+            <a:fillRect/>
+          </a:stretch>
+        </p:blipFill>
+        <p:spPr>
+          <a:xfrm>
+            <a:off x="3084575" y="5460024"/>
+            <a:ext cx="609600" cy="609600"/>
+          </a:xfrm>
+        </p:spPr>
+      </p:pic>
       <p:sp>
         <p:nvSpPr>
           <p:cNvPr id="4" name="Fußzeilenplatzhalter 3"/>
@@ -6241,10 +7778,529 @@
           </a:p>
         </p:txBody>
       </p:sp>
+      <p:pic>
+        <p:nvPicPr>
+          <p:cNvPr id="10" name="Grafik 9"/>
+          <p:cNvPicPr>
+            <a:picLocks noChangeAspect="1"/>
+          </p:cNvPicPr>
+          <p:nvPr/>
+        </p:nvPicPr>
+        <p:blipFill>
+          <a:blip r:embed="rId4">
+            <a:extLst>
+              <a:ext uri="{28A0092B-C50C-407E-A947-70E740481C1C}">
+                <a14:useLocalDpi xmlns:a14="http://schemas.microsoft.com/office/drawing/2010/main" val="0"/>
+              </a:ext>
+            </a:extLst>
+          </a:blip>
+          <a:stretch>
+            <a:fillRect/>
+          </a:stretch>
+        </p:blipFill>
+        <p:spPr>
+          <a:xfrm>
+            <a:off x="1389888" y="2119261"/>
+            <a:ext cx="920496" cy="920496"/>
+          </a:xfrm>
+          <a:prstGeom prst="rect">
+            <a:avLst/>
+          </a:prstGeom>
+        </p:spPr>
+      </p:pic>
+      <p:pic>
+        <p:nvPicPr>
+          <p:cNvPr id="11" name="Grafik 10"/>
+          <p:cNvPicPr>
+            <a:picLocks noChangeAspect="1"/>
+          </p:cNvPicPr>
+          <p:nvPr/>
+        </p:nvPicPr>
+        <p:blipFill>
+          <a:blip r:embed="rId4">
+            <a:extLst>
+              <a:ext uri="{28A0092B-C50C-407E-A947-70E740481C1C}">
+                <a14:useLocalDpi xmlns:a14="http://schemas.microsoft.com/office/drawing/2010/main" val="0"/>
+              </a:ext>
+            </a:extLst>
+          </a:blip>
+          <a:stretch>
+            <a:fillRect/>
+          </a:stretch>
+        </p:blipFill>
+        <p:spPr>
+          <a:xfrm>
+            <a:off x="2929127" y="2103513"/>
+            <a:ext cx="920497" cy="920497"/>
+          </a:xfrm>
+          <a:prstGeom prst="rect">
+            <a:avLst/>
+          </a:prstGeom>
+        </p:spPr>
+      </p:pic>
+      <p:pic>
+        <p:nvPicPr>
+          <p:cNvPr id="12" name="Grafik 11"/>
+          <p:cNvPicPr>
+            <a:picLocks noChangeAspect="1"/>
+          </p:cNvPicPr>
+          <p:nvPr/>
+        </p:nvPicPr>
+        <p:blipFill>
+          <a:blip r:embed="rId4">
+            <a:extLst>
+              <a:ext uri="{28A0092B-C50C-407E-A947-70E740481C1C}">
+                <a14:useLocalDpi xmlns:a14="http://schemas.microsoft.com/office/drawing/2010/main" val="0"/>
+              </a:ext>
+            </a:extLst>
+          </a:blip>
+          <a:stretch>
+            <a:fillRect/>
+          </a:stretch>
+        </p:blipFill>
+        <p:spPr>
+          <a:xfrm>
+            <a:off x="4483608" y="2119261"/>
+            <a:ext cx="920496" cy="920496"/>
+          </a:xfrm>
+          <a:prstGeom prst="rect">
+            <a:avLst/>
+          </a:prstGeom>
+        </p:spPr>
+      </p:pic>
+      <p:pic>
+        <p:nvPicPr>
+          <p:cNvPr id="13" name="Grafik 12"/>
+          <p:cNvPicPr>
+            <a:picLocks noChangeAspect="1"/>
+          </p:cNvPicPr>
+          <p:nvPr/>
+        </p:nvPicPr>
+        <p:blipFill>
+          <a:blip r:embed="rId5">
+            <a:extLst>
+              <a:ext uri="{28A0092B-C50C-407E-A947-70E740481C1C}">
+                <a14:useLocalDpi xmlns:a14="http://schemas.microsoft.com/office/drawing/2010/main" val="0"/>
+              </a:ext>
+            </a:extLst>
+          </a:blip>
+          <a:stretch>
+            <a:fillRect/>
+          </a:stretch>
+        </p:blipFill>
+        <p:spPr>
+          <a:xfrm>
+            <a:off x="2778251" y="3412395"/>
+            <a:ext cx="1222248" cy="1222248"/>
+          </a:xfrm>
+          <a:prstGeom prst="rect">
+            <a:avLst/>
+          </a:prstGeom>
+        </p:spPr>
+      </p:pic>
+      <p:sp>
+        <p:nvSpPr>
+          <p:cNvPr id="3" name="Textfeld 2"/>
+          <p:cNvSpPr txBox="1"/>
+          <p:nvPr/>
+        </p:nvSpPr>
+        <p:spPr>
+          <a:xfrm>
+            <a:off x="6449568" y="2369677"/>
+            <a:ext cx="4946904" cy="2677656"/>
+          </a:xfrm>
+          <a:prstGeom prst="rect">
+            <a:avLst/>
+          </a:prstGeom>
+          <a:noFill/>
+        </p:spPr>
+        <p:txBody>
+          <a:bodyPr wrap="square" rtlCol="0">
+            <a:spAutoFit/>
+          </a:bodyPr>
+          <a:lstStyle/>
+          <a:p>
+            <a:r>
+              <a:rPr lang="de-DE" sz="2800" b="1" dirty="0" smtClean="0"/>
+              <a:t>Read</a:t>
+            </a:r>
+          </a:p>
+          <a:p>
+            <a:pPr marL="514350" indent="-514350">
+              <a:buAutoNum type="arabicPeriod"/>
+            </a:pPr>
+            <a:r>
+              <a:rPr lang="de-DE" sz="2800" dirty="0" smtClean="0"/>
+              <a:t>File </a:t>
+            </a:r>
+            <a:r>
+              <a:rPr lang="de-DE" sz="2800" dirty="0" err="1" smtClean="0"/>
+              <a:t>name</a:t>
+            </a:r>
+            <a:r>
+              <a:rPr lang="de-DE" sz="2800" dirty="0" smtClean="0"/>
+              <a:t> </a:t>
+            </a:r>
+            <a:r>
+              <a:rPr lang="de-DE" sz="2800" dirty="0" err="1" smtClean="0"/>
+              <a:t>and</a:t>
+            </a:r>
+            <a:r>
+              <a:rPr lang="de-DE" sz="2800" dirty="0" smtClean="0"/>
+              <a:t> </a:t>
+            </a:r>
+            <a:r>
+              <a:rPr lang="de-DE" sz="2800" dirty="0" err="1" smtClean="0"/>
+              <a:t>chunk</a:t>
+            </a:r>
+            <a:r>
+              <a:rPr lang="de-DE" sz="2800" dirty="0" smtClean="0"/>
+              <a:t> </a:t>
+            </a:r>
+            <a:r>
+              <a:rPr lang="de-DE" sz="2800" dirty="0" err="1" smtClean="0"/>
+              <a:t>index</a:t>
+            </a:r>
+            <a:endParaRPr lang="de-DE" sz="2800" dirty="0" smtClean="0"/>
+          </a:p>
+          <a:p>
+            <a:pPr marL="514350" indent="-514350">
+              <a:buAutoNum type="arabicPeriod"/>
+            </a:pPr>
+            <a:r>
+              <a:rPr lang="de-DE" sz="2800" dirty="0" err="1" smtClean="0"/>
+              <a:t>Chunk</a:t>
+            </a:r>
+            <a:r>
+              <a:rPr lang="de-DE" sz="2800" dirty="0" smtClean="0"/>
+              <a:t> handle </a:t>
+            </a:r>
+            <a:r>
+              <a:rPr lang="de-DE" sz="2800" dirty="0" err="1" smtClean="0"/>
+              <a:t>and</a:t>
+            </a:r>
+            <a:r>
+              <a:rPr lang="de-DE" sz="2800" dirty="0" smtClean="0"/>
+              <a:t> </a:t>
+            </a:r>
+            <a:r>
+              <a:rPr lang="de-DE" sz="2800" dirty="0" err="1" smtClean="0"/>
+              <a:t>location</a:t>
+            </a:r>
+            <a:endParaRPr lang="de-DE" sz="2800" dirty="0" smtClean="0"/>
+          </a:p>
+          <a:p>
+            <a:pPr marL="514350" indent="-514350">
+              <a:buAutoNum type="arabicPeriod"/>
+            </a:pPr>
+            <a:r>
+              <a:rPr lang="de-DE" sz="2800" dirty="0" err="1" smtClean="0"/>
+              <a:t>Chunk</a:t>
+            </a:r>
+            <a:r>
+              <a:rPr lang="de-DE" sz="2800" dirty="0" smtClean="0"/>
+              <a:t> handle </a:t>
+            </a:r>
+            <a:r>
+              <a:rPr lang="de-DE" sz="2800" dirty="0" err="1" smtClean="0"/>
+              <a:t>and</a:t>
+            </a:r>
+            <a:r>
+              <a:rPr lang="de-DE" sz="2800" dirty="0" smtClean="0"/>
+              <a:t> </a:t>
+            </a:r>
+            <a:r>
+              <a:rPr lang="de-DE" sz="2800" dirty="0" err="1" smtClean="0"/>
+              <a:t>byte</a:t>
+            </a:r>
+            <a:r>
+              <a:rPr lang="de-DE" sz="2800" dirty="0" smtClean="0"/>
+              <a:t> </a:t>
+            </a:r>
+            <a:r>
+              <a:rPr lang="de-DE" sz="2800" dirty="0" err="1" smtClean="0"/>
+              <a:t>range</a:t>
+            </a:r>
+            <a:endParaRPr lang="de-DE" sz="2800" dirty="0" smtClean="0"/>
+          </a:p>
+          <a:p>
+            <a:pPr marL="514350" indent="-514350">
+              <a:buAutoNum type="arabicPeriod"/>
+            </a:pPr>
+            <a:r>
+              <a:rPr lang="de-DE" sz="2800" dirty="0" smtClean="0"/>
+              <a:t>Data</a:t>
+            </a:r>
+          </a:p>
+          <a:p>
+            <a:pPr marL="514350" indent="-514350">
+              <a:buAutoNum type="arabicPeriod"/>
+            </a:pPr>
+            <a:endParaRPr lang="de-DE" sz="2800" dirty="0"/>
+          </a:p>
+        </p:txBody>
+      </p:sp>
+      <p:cxnSp>
+        <p:nvCxnSpPr>
+          <p:cNvPr id="8" name="Gerade Verbindung mit Pfeil 7"/>
+          <p:cNvCxnSpPr/>
+          <p:nvPr/>
+        </p:nvCxnSpPr>
+        <p:spPr>
+          <a:xfrm flipV="1">
+            <a:off x="3279647" y="4634643"/>
+            <a:ext cx="0" cy="825381"/>
+          </a:xfrm>
+          <a:prstGeom prst="straightConnector1">
+            <a:avLst/>
+          </a:prstGeom>
+          <a:ln>
+            <a:tailEnd type="triangle"/>
+          </a:ln>
+        </p:spPr>
+        <p:style>
+          <a:lnRef idx="1">
+            <a:schemeClr val="accent1"/>
+          </a:lnRef>
+          <a:fillRef idx="0">
+            <a:schemeClr val="accent1"/>
+          </a:fillRef>
+          <a:effectRef idx="0">
+            <a:schemeClr val="accent1"/>
+          </a:effectRef>
+          <a:fontRef idx="minor">
+            <a:schemeClr val="tx1"/>
+          </a:fontRef>
+        </p:style>
+      </p:cxnSp>
+      <p:sp>
+        <p:nvSpPr>
+          <p:cNvPr id="9" name="Textfeld 8"/>
+          <p:cNvSpPr txBox="1"/>
+          <p:nvPr/>
+        </p:nvSpPr>
+        <p:spPr>
+          <a:xfrm>
+            <a:off x="3038855" y="4862667"/>
+            <a:ext cx="301686" cy="369332"/>
+          </a:xfrm>
+          <a:prstGeom prst="rect">
+            <a:avLst/>
+          </a:prstGeom>
+          <a:noFill/>
+        </p:spPr>
+        <p:txBody>
+          <a:bodyPr wrap="none" rtlCol="0">
+            <a:spAutoFit/>
+          </a:bodyPr>
+          <a:lstStyle/>
+          <a:p>
+            <a:r>
+              <a:rPr lang="de-DE" dirty="0" smtClean="0"/>
+              <a:t>1</a:t>
+            </a:r>
+            <a:endParaRPr lang="de-DE" dirty="0"/>
+          </a:p>
+        </p:txBody>
+      </p:sp>
+      <p:cxnSp>
+        <p:nvCxnSpPr>
+          <p:cNvPr id="19" name="Gerade Verbindung mit Pfeil 18"/>
+          <p:cNvCxnSpPr/>
+          <p:nvPr/>
+        </p:nvCxnSpPr>
+        <p:spPr>
+          <a:xfrm>
+            <a:off x="3419855" y="4634643"/>
+            <a:ext cx="0" cy="825381"/>
+          </a:xfrm>
+          <a:prstGeom prst="straightConnector1">
+            <a:avLst/>
+          </a:prstGeom>
+          <a:ln>
+            <a:tailEnd type="triangle"/>
+          </a:ln>
+        </p:spPr>
+        <p:style>
+          <a:lnRef idx="1">
+            <a:schemeClr val="accent1"/>
+          </a:lnRef>
+          <a:fillRef idx="0">
+            <a:schemeClr val="accent1"/>
+          </a:fillRef>
+          <a:effectRef idx="0">
+            <a:schemeClr val="accent1"/>
+          </a:effectRef>
+          <a:fontRef idx="minor">
+            <a:schemeClr val="tx1"/>
+          </a:fontRef>
+        </p:style>
+      </p:cxnSp>
+      <p:sp>
+        <p:nvSpPr>
+          <p:cNvPr id="27" name="Textfeld 26"/>
+          <p:cNvSpPr txBox="1"/>
+          <p:nvPr/>
+        </p:nvSpPr>
+        <p:spPr>
+          <a:xfrm>
+            <a:off x="3386261" y="4862667"/>
+            <a:ext cx="301686" cy="369332"/>
+          </a:xfrm>
+          <a:prstGeom prst="rect">
+            <a:avLst/>
+          </a:prstGeom>
+          <a:noFill/>
+        </p:spPr>
+        <p:txBody>
+          <a:bodyPr wrap="none" rtlCol="0">
+            <a:spAutoFit/>
+          </a:bodyPr>
+          <a:lstStyle/>
+          <a:p>
+            <a:r>
+              <a:rPr lang="de-DE" dirty="0" smtClean="0"/>
+              <a:t>2</a:t>
+            </a:r>
+            <a:endParaRPr lang="de-DE" dirty="0"/>
+          </a:p>
+        </p:txBody>
+      </p:sp>
+      <p:cxnSp>
+        <p:nvCxnSpPr>
+          <p:cNvPr id="21" name="Gewinkelte Verbindung 20"/>
+          <p:cNvCxnSpPr>
+            <a:stCxn id="6" idx="1"/>
+            <a:endCxn id="10" idx="2"/>
+          </p:cNvCxnSpPr>
+          <p:nvPr/>
+        </p:nvCxnSpPr>
+        <p:spPr>
+          <a:xfrm rot="10800000">
+            <a:off x="1850137" y="3039758"/>
+            <a:ext cx="1234439" cy="2725067"/>
+          </a:xfrm>
+          <a:prstGeom prst="bentConnector2">
+            <a:avLst/>
+          </a:prstGeom>
+          <a:ln>
+            <a:tailEnd type="triangle"/>
+          </a:ln>
+        </p:spPr>
+        <p:style>
+          <a:lnRef idx="1">
+            <a:schemeClr val="accent1"/>
+          </a:lnRef>
+          <a:fillRef idx="0">
+            <a:schemeClr val="accent1"/>
+          </a:fillRef>
+          <a:effectRef idx="0">
+            <a:schemeClr val="accent1"/>
+          </a:effectRef>
+          <a:fontRef idx="minor">
+            <a:schemeClr val="tx1"/>
+          </a:fontRef>
+        </p:style>
+      </p:cxnSp>
+      <p:sp>
+        <p:nvSpPr>
+          <p:cNvPr id="30" name="Textfeld 29"/>
+          <p:cNvSpPr txBox="1"/>
+          <p:nvPr/>
+        </p:nvSpPr>
+        <p:spPr>
+          <a:xfrm>
+            <a:off x="1810511" y="4429851"/>
+            <a:ext cx="301686" cy="369332"/>
+          </a:xfrm>
+          <a:prstGeom prst="rect">
+            <a:avLst/>
+          </a:prstGeom>
+          <a:noFill/>
+        </p:spPr>
+        <p:txBody>
+          <a:bodyPr wrap="none" rtlCol="0">
+            <a:spAutoFit/>
+          </a:bodyPr>
+          <a:lstStyle/>
+          <a:p>
+            <a:r>
+              <a:rPr lang="de-DE" dirty="0" smtClean="0"/>
+              <a:t>3</a:t>
+            </a:r>
+            <a:endParaRPr lang="de-DE" dirty="0"/>
+          </a:p>
+        </p:txBody>
+      </p:sp>
+      <p:cxnSp>
+        <p:nvCxnSpPr>
+          <p:cNvPr id="31" name="Gewinkelte Verbindung 30"/>
+          <p:cNvCxnSpPr/>
+          <p:nvPr/>
+        </p:nvCxnSpPr>
+        <p:spPr>
+          <a:xfrm rot="16200000" flipV="1">
+            <a:off x="952500" y="3857245"/>
+            <a:ext cx="2862072" cy="1310637"/>
+          </a:xfrm>
+          <a:prstGeom prst="bentConnector3">
+            <a:avLst>
+              <a:gd name="adj1" fmla="val 160"/>
+            </a:avLst>
+          </a:prstGeom>
+          <a:ln>
+            <a:headEnd type="triangle" w="med" len="med"/>
+            <a:tailEnd type="none" w="med" len="med"/>
+          </a:ln>
+        </p:spPr>
+        <p:style>
+          <a:lnRef idx="1">
+            <a:schemeClr val="accent1"/>
+          </a:lnRef>
+          <a:fillRef idx="0">
+            <a:schemeClr val="accent1"/>
+          </a:fillRef>
+          <a:effectRef idx="0">
+            <a:schemeClr val="accent1"/>
+          </a:effectRef>
+          <a:fontRef idx="minor">
+            <a:schemeClr val="tx1"/>
+          </a:fontRef>
+        </p:style>
+      </p:cxnSp>
+      <p:sp>
+        <p:nvSpPr>
+          <p:cNvPr id="39" name="Textfeld 38"/>
+          <p:cNvSpPr txBox="1"/>
+          <p:nvPr/>
+        </p:nvSpPr>
+        <p:spPr>
+          <a:xfrm>
+            <a:off x="1459993" y="4429851"/>
+            <a:ext cx="301686" cy="369332"/>
+          </a:xfrm>
+          <a:prstGeom prst="rect">
+            <a:avLst/>
+          </a:prstGeom>
+          <a:noFill/>
+        </p:spPr>
+        <p:txBody>
+          <a:bodyPr wrap="none" rtlCol="0">
+            <a:spAutoFit/>
+          </a:bodyPr>
+          <a:lstStyle/>
+          <a:p>
+            <a:r>
+              <a:rPr lang="de-DE" dirty="0"/>
+              <a:t>4</a:t>
+            </a:r>
+          </a:p>
+        </p:txBody>
+      </p:sp>
     </p:spTree>
     <p:extLst>
       <p:ext uri="{BB962C8B-B14F-4D97-AF65-F5344CB8AC3E}">
-        <p14:creationId xmlns:p14="http://schemas.microsoft.com/office/powerpoint/2010/main" val="4157981273"/>
+        <p14:creationId xmlns:p14="http://schemas.microsoft.com/office/powerpoint/2010/main" val="3995855083"/>
       </p:ext>
     </p:extLst>
   </p:cSld>
@@ -6254,9 +8310,514 @@
   <p:timing>
     <p:tnLst>
       <p:par>
-        <p:cTn id="1" dur="indefinite" restart="never" nodeType="tmRoot"/>
+        <p:cTn id="1" dur="indefinite" restart="never" nodeType="tmRoot">
+          <p:childTnLst>
+            <p:seq concurrent="1" nextAc="seek">
+              <p:cTn id="2" dur="indefinite" nodeType="mainSeq">
+                <p:childTnLst>
+                  <p:par>
+                    <p:cTn id="3" fill="hold">
+                      <p:stCondLst>
+                        <p:cond delay="indefinite"/>
+                      </p:stCondLst>
+                      <p:childTnLst>
+                        <p:par>
+                          <p:cTn id="4" fill="hold">
+                            <p:stCondLst>
+                              <p:cond delay="0"/>
+                            </p:stCondLst>
+                            <p:childTnLst>
+                              <p:par>
+                                <p:cTn id="5" presetID="1" presetClass="entr" presetSubtype="0" fill="hold" nodeType="clickEffect">
+                                  <p:stCondLst>
+                                    <p:cond delay="0"/>
+                                  </p:stCondLst>
+                                  <p:childTnLst>
+                                    <p:set>
+                                      <p:cBhvr>
+                                        <p:cTn id="6" dur="1" fill="hold">
+                                          <p:stCondLst>
+                                            <p:cond delay="0"/>
+                                          </p:stCondLst>
+                                        </p:cTn>
+                                        <p:tgtEl>
+                                          <p:spTgt spid="3">
+                                            <p:txEl>
+                                              <p:pRg st="1" end="1"/>
+                                            </p:txEl>
+                                          </p:spTgt>
+                                        </p:tgtEl>
+                                        <p:attrNameLst>
+                                          <p:attrName>style.visibility</p:attrName>
+                                        </p:attrNameLst>
+                                      </p:cBhvr>
+                                      <p:to>
+                                        <p:strVal val="visible"/>
+                                      </p:to>
+                                    </p:set>
+                                  </p:childTnLst>
+                                </p:cTn>
+                              </p:par>
+                              <p:par>
+                                <p:cTn id="7" presetID="22" presetClass="entr" presetSubtype="4" fill="hold" grpId="0" nodeType="withEffect">
+                                  <p:stCondLst>
+                                    <p:cond delay="0"/>
+                                  </p:stCondLst>
+                                  <p:childTnLst>
+                                    <p:set>
+                                      <p:cBhvr>
+                                        <p:cTn id="8" dur="1" fill="hold">
+                                          <p:stCondLst>
+                                            <p:cond delay="0"/>
+                                          </p:stCondLst>
+                                        </p:cTn>
+                                        <p:tgtEl>
+                                          <p:spTgt spid="9"/>
+                                        </p:tgtEl>
+                                        <p:attrNameLst>
+                                          <p:attrName>style.visibility</p:attrName>
+                                        </p:attrNameLst>
+                                      </p:cBhvr>
+                                      <p:to>
+                                        <p:strVal val="visible"/>
+                                      </p:to>
+                                    </p:set>
+                                    <p:animEffect transition="in" filter="wipe(down)">
+                                      <p:cBhvr>
+                                        <p:cTn id="9" dur="500"/>
+                                        <p:tgtEl>
+                                          <p:spTgt spid="9"/>
+                                        </p:tgtEl>
+                                      </p:cBhvr>
+                                    </p:animEffect>
+                                  </p:childTnLst>
+                                </p:cTn>
+                              </p:par>
+                              <p:par>
+                                <p:cTn id="10" presetID="22" presetClass="entr" presetSubtype="4" fill="hold" nodeType="withEffect">
+                                  <p:stCondLst>
+                                    <p:cond delay="0"/>
+                                  </p:stCondLst>
+                                  <p:childTnLst>
+                                    <p:set>
+                                      <p:cBhvr>
+                                        <p:cTn id="11" dur="1" fill="hold">
+                                          <p:stCondLst>
+                                            <p:cond delay="0"/>
+                                          </p:stCondLst>
+                                        </p:cTn>
+                                        <p:tgtEl>
+                                          <p:spTgt spid="8"/>
+                                        </p:tgtEl>
+                                        <p:attrNameLst>
+                                          <p:attrName>style.visibility</p:attrName>
+                                        </p:attrNameLst>
+                                      </p:cBhvr>
+                                      <p:to>
+                                        <p:strVal val="visible"/>
+                                      </p:to>
+                                    </p:set>
+                                    <p:animEffect transition="in" filter="wipe(down)">
+                                      <p:cBhvr>
+                                        <p:cTn id="12" dur="500"/>
+                                        <p:tgtEl>
+                                          <p:spTgt spid="8"/>
+                                        </p:tgtEl>
+                                      </p:cBhvr>
+                                    </p:animEffect>
+                                  </p:childTnLst>
+                                </p:cTn>
+                              </p:par>
+                            </p:childTnLst>
+                          </p:cTn>
+                        </p:par>
+                      </p:childTnLst>
+                    </p:cTn>
+                  </p:par>
+                  <p:par>
+                    <p:cTn id="13" fill="hold">
+                      <p:stCondLst>
+                        <p:cond delay="indefinite"/>
+                      </p:stCondLst>
+                      <p:childTnLst>
+                        <p:par>
+                          <p:cTn id="14" fill="hold">
+                            <p:stCondLst>
+                              <p:cond delay="0"/>
+                            </p:stCondLst>
+                            <p:childTnLst>
+                              <p:par>
+                                <p:cTn id="15" presetID="1" presetClass="entr" presetSubtype="0" fill="hold" nodeType="clickEffect">
+                                  <p:stCondLst>
+                                    <p:cond delay="0"/>
+                                  </p:stCondLst>
+                                  <p:childTnLst>
+                                    <p:set>
+                                      <p:cBhvr>
+                                        <p:cTn id="16" dur="1" fill="hold">
+                                          <p:stCondLst>
+                                            <p:cond delay="0"/>
+                                          </p:stCondLst>
+                                        </p:cTn>
+                                        <p:tgtEl>
+                                          <p:spTgt spid="3">
+                                            <p:txEl>
+                                              <p:pRg st="2" end="2"/>
+                                            </p:txEl>
+                                          </p:spTgt>
+                                        </p:tgtEl>
+                                        <p:attrNameLst>
+                                          <p:attrName>style.visibility</p:attrName>
+                                        </p:attrNameLst>
+                                      </p:cBhvr>
+                                      <p:to>
+                                        <p:strVal val="visible"/>
+                                      </p:to>
+                                    </p:set>
+                                  </p:childTnLst>
+                                </p:cTn>
+                              </p:par>
+                              <p:par>
+                                <p:cTn id="17" presetID="22" presetClass="entr" presetSubtype="1" fill="hold" grpId="0" nodeType="withEffect">
+                                  <p:stCondLst>
+                                    <p:cond delay="0"/>
+                                  </p:stCondLst>
+                                  <p:childTnLst>
+                                    <p:set>
+                                      <p:cBhvr>
+                                        <p:cTn id="18" dur="1" fill="hold">
+                                          <p:stCondLst>
+                                            <p:cond delay="0"/>
+                                          </p:stCondLst>
+                                        </p:cTn>
+                                        <p:tgtEl>
+                                          <p:spTgt spid="27"/>
+                                        </p:tgtEl>
+                                        <p:attrNameLst>
+                                          <p:attrName>style.visibility</p:attrName>
+                                        </p:attrNameLst>
+                                      </p:cBhvr>
+                                      <p:to>
+                                        <p:strVal val="visible"/>
+                                      </p:to>
+                                    </p:set>
+                                    <p:animEffect transition="in" filter="wipe(up)">
+                                      <p:cBhvr>
+                                        <p:cTn id="19" dur="500"/>
+                                        <p:tgtEl>
+                                          <p:spTgt spid="27"/>
+                                        </p:tgtEl>
+                                      </p:cBhvr>
+                                    </p:animEffect>
+                                  </p:childTnLst>
+                                </p:cTn>
+                              </p:par>
+                              <p:par>
+                                <p:cTn id="20" presetID="22" presetClass="entr" presetSubtype="1" fill="hold" nodeType="withEffect">
+                                  <p:stCondLst>
+                                    <p:cond delay="0"/>
+                                  </p:stCondLst>
+                                  <p:childTnLst>
+                                    <p:set>
+                                      <p:cBhvr>
+                                        <p:cTn id="21" dur="1" fill="hold">
+                                          <p:stCondLst>
+                                            <p:cond delay="0"/>
+                                          </p:stCondLst>
+                                        </p:cTn>
+                                        <p:tgtEl>
+                                          <p:spTgt spid="19"/>
+                                        </p:tgtEl>
+                                        <p:attrNameLst>
+                                          <p:attrName>style.visibility</p:attrName>
+                                        </p:attrNameLst>
+                                      </p:cBhvr>
+                                      <p:to>
+                                        <p:strVal val="visible"/>
+                                      </p:to>
+                                    </p:set>
+                                    <p:animEffect transition="in" filter="wipe(up)">
+                                      <p:cBhvr>
+                                        <p:cTn id="22" dur="500"/>
+                                        <p:tgtEl>
+                                          <p:spTgt spid="19"/>
+                                        </p:tgtEl>
+                                      </p:cBhvr>
+                                    </p:animEffect>
+                                  </p:childTnLst>
+                                </p:cTn>
+                              </p:par>
+                            </p:childTnLst>
+                          </p:cTn>
+                        </p:par>
+                      </p:childTnLst>
+                    </p:cTn>
+                  </p:par>
+                  <p:par>
+                    <p:cTn id="23" fill="hold">
+                      <p:stCondLst>
+                        <p:cond delay="indefinite"/>
+                      </p:stCondLst>
+                      <p:childTnLst>
+                        <p:par>
+                          <p:cTn id="24" fill="hold">
+                            <p:stCondLst>
+                              <p:cond delay="0"/>
+                            </p:stCondLst>
+                            <p:childTnLst>
+                              <p:par>
+                                <p:cTn id="25" presetID="1" presetClass="entr" presetSubtype="0" fill="hold" nodeType="clickEffect">
+                                  <p:stCondLst>
+                                    <p:cond delay="0"/>
+                                  </p:stCondLst>
+                                  <p:childTnLst>
+                                    <p:set>
+                                      <p:cBhvr>
+                                        <p:cTn id="26" dur="1" fill="hold">
+                                          <p:stCondLst>
+                                            <p:cond delay="0"/>
+                                          </p:stCondLst>
+                                        </p:cTn>
+                                        <p:tgtEl>
+                                          <p:spTgt spid="3">
+                                            <p:txEl>
+                                              <p:pRg st="3" end="3"/>
+                                            </p:txEl>
+                                          </p:spTgt>
+                                        </p:tgtEl>
+                                        <p:attrNameLst>
+                                          <p:attrName>style.visibility</p:attrName>
+                                        </p:attrNameLst>
+                                      </p:cBhvr>
+                                      <p:to>
+                                        <p:strVal val="visible"/>
+                                      </p:to>
+                                    </p:set>
+                                  </p:childTnLst>
+                                </p:cTn>
+                              </p:par>
+                              <p:par>
+                                <p:cTn id="27" presetID="22" presetClass="entr" presetSubtype="4" fill="hold" grpId="0" nodeType="withEffect">
+                                  <p:stCondLst>
+                                    <p:cond delay="0"/>
+                                  </p:stCondLst>
+                                  <p:childTnLst>
+                                    <p:set>
+                                      <p:cBhvr>
+                                        <p:cTn id="28" dur="1" fill="hold">
+                                          <p:stCondLst>
+                                            <p:cond delay="0"/>
+                                          </p:stCondLst>
+                                        </p:cTn>
+                                        <p:tgtEl>
+                                          <p:spTgt spid="30"/>
+                                        </p:tgtEl>
+                                        <p:attrNameLst>
+                                          <p:attrName>style.visibility</p:attrName>
+                                        </p:attrNameLst>
+                                      </p:cBhvr>
+                                      <p:to>
+                                        <p:strVal val="visible"/>
+                                      </p:to>
+                                    </p:set>
+                                    <p:animEffect transition="in" filter="wipe(down)">
+                                      <p:cBhvr>
+                                        <p:cTn id="29" dur="500"/>
+                                        <p:tgtEl>
+                                          <p:spTgt spid="30"/>
+                                        </p:tgtEl>
+                                      </p:cBhvr>
+                                    </p:animEffect>
+                                  </p:childTnLst>
+                                </p:cTn>
+                              </p:par>
+                              <p:par>
+                                <p:cTn id="30" presetID="22" presetClass="entr" presetSubtype="4" fill="hold" nodeType="withEffect">
+                                  <p:stCondLst>
+                                    <p:cond delay="0"/>
+                                  </p:stCondLst>
+                                  <p:childTnLst>
+                                    <p:set>
+                                      <p:cBhvr>
+                                        <p:cTn id="31" dur="1" fill="hold">
+                                          <p:stCondLst>
+                                            <p:cond delay="0"/>
+                                          </p:stCondLst>
+                                        </p:cTn>
+                                        <p:tgtEl>
+                                          <p:spTgt spid="21"/>
+                                        </p:tgtEl>
+                                        <p:attrNameLst>
+                                          <p:attrName>style.visibility</p:attrName>
+                                        </p:attrNameLst>
+                                      </p:cBhvr>
+                                      <p:to>
+                                        <p:strVal val="visible"/>
+                                      </p:to>
+                                    </p:set>
+                                    <p:animEffect transition="in" filter="wipe(down)">
+                                      <p:cBhvr>
+                                        <p:cTn id="32" dur="500"/>
+                                        <p:tgtEl>
+                                          <p:spTgt spid="21"/>
+                                        </p:tgtEl>
+                                      </p:cBhvr>
+                                    </p:animEffect>
+                                  </p:childTnLst>
+                                </p:cTn>
+                              </p:par>
+                            </p:childTnLst>
+                          </p:cTn>
+                        </p:par>
+                      </p:childTnLst>
+                    </p:cTn>
+                  </p:par>
+                  <p:par>
+                    <p:cTn id="33" fill="hold">
+                      <p:stCondLst>
+                        <p:cond delay="indefinite"/>
+                      </p:stCondLst>
+                      <p:childTnLst>
+                        <p:par>
+                          <p:cTn id="34" fill="hold">
+                            <p:stCondLst>
+                              <p:cond delay="0"/>
+                            </p:stCondLst>
+                            <p:childTnLst>
+                              <p:par>
+                                <p:cTn id="35" presetID="1" presetClass="entr" presetSubtype="0" fill="hold" nodeType="clickEffect">
+                                  <p:stCondLst>
+                                    <p:cond delay="0"/>
+                                  </p:stCondLst>
+                                  <p:childTnLst>
+                                    <p:set>
+                                      <p:cBhvr>
+                                        <p:cTn id="36" dur="1" fill="hold">
+                                          <p:stCondLst>
+                                            <p:cond delay="0"/>
+                                          </p:stCondLst>
+                                        </p:cTn>
+                                        <p:tgtEl>
+                                          <p:spTgt spid="3">
+                                            <p:txEl>
+                                              <p:pRg st="4" end="4"/>
+                                            </p:txEl>
+                                          </p:spTgt>
+                                        </p:tgtEl>
+                                        <p:attrNameLst>
+                                          <p:attrName>style.visibility</p:attrName>
+                                        </p:attrNameLst>
+                                      </p:cBhvr>
+                                      <p:to>
+                                        <p:strVal val="visible"/>
+                                      </p:to>
+                                    </p:set>
+                                  </p:childTnLst>
+                                </p:cTn>
+                              </p:par>
+                              <p:par>
+                                <p:cTn id="37" presetID="22" presetClass="entr" presetSubtype="1" fill="hold" grpId="0" nodeType="withEffect">
+                                  <p:stCondLst>
+                                    <p:cond delay="0"/>
+                                  </p:stCondLst>
+                                  <p:childTnLst>
+                                    <p:set>
+                                      <p:cBhvr>
+                                        <p:cTn id="38" dur="1" fill="hold">
+                                          <p:stCondLst>
+                                            <p:cond delay="0"/>
+                                          </p:stCondLst>
+                                        </p:cTn>
+                                        <p:tgtEl>
+                                          <p:spTgt spid="39"/>
+                                        </p:tgtEl>
+                                        <p:attrNameLst>
+                                          <p:attrName>style.visibility</p:attrName>
+                                        </p:attrNameLst>
+                                      </p:cBhvr>
+                                      <p:to>
+                                        <p:strVal val="visible"/>
+                                      </p:to>
+                                    </p:set>
+                                    <p:animEffect transition="in" filter="wipe(up)">
+                                      <p:cBhvr>
+                                        <p:cTn id="39" dur="500"/>
+                                        <p:tgtEl>
+                                          <p:spTgt spid="39"/>
+                                        </p:tgtEl>
+                                      </p:cBhvr>
+                                    </p:animEffect>
+                                  </p:childTnLst>
+                                </p:cTn>
+                              </p:par>
+                              <p:par>
+                                <p:cTn id="40" presetID="22" presetClass="entr" presetSubtype="1" fill="hold" nodeType="withEffect">
+                                  <p:stCondLst>
+                                    <p:cond delay="0"/>
+                                  </p:stCondLst>
+                                  <p:childTnLst>
+                                    <p:set>
+                                      <p:cBhvr>
+                                        <p:cTn id="41" dur="1" fill="hold">
+                                          <p:stCondLst>
+                                            <p:cond delay="0"/>
+                                          </p:stCondLst>
+                                        </p:cTn>
+                                        <p:tgtEl>
+                                          <p:spTgt spid="31"/>
+                                        </p:tgtEl>
+                                        <p:attrNameLst>
+                                          <p:attrName>style.visibility</p:attrName>
+                                        </p:attrNameLst>
+                                      </p:cBhvr>
+                                      <p:to>
+                                        <p:strVal val="visible"/>
+                                      </p:to>
+                                    </p:set>
+                                    <p:animEffect transition="in" filter="wipe(up)">
+                                      <p:cBhvr>
+                                        <p:cTn id="42" dur="500"/>
+                                        <p:tgtEl>
+                                          <p:spTgt spid="31"/>
+                                        </p:tgtEl>
+                                      </p:cBhvr>
+                                    </p:animEffect>
+                                  </p:childTnLst>
+                                </p:cTn>
+                              </p:par>
+                            </p:childTnLst>
+                          </p:cTn>
+                        </p:par>
+                      </p:childTnLst>
+                    </p:cTn>
+                  </p:par>
+                </p:childTnLst>
+              </p:cTn>
+              <p:prevCondLst>
+                <p:cond evt="onPrev" delay="0">
+                  <p:tgtEl>
+                    <p:sldTgt/>
+                  </p:tgtEl>
+                </p:cond>
+              </p:prevCondLst>
+              <p:nextCondLst>
+                <p:cond evt="onNext" delay="0">
+                  <p:tgtEl>
+                    <p:sldTgt/>
+                  </p:tgtEl>
+                </p:cond>
+              </p:nextCondLst>
+            </p:seq>
+          </p:childTnLst>
+        </p:cTn>
       </p:par>
     </p:tnLst>
+    <p:bldLst>
+      <p:bldP spid="9" grpId="0"/>
+      <p:bldP spid="27" grpId="0"/>
+      <p:bldP spid="30" grpId="0"/>
+      <p:bldP spid="39" grpId="0"/>
+    </p:bldLst>
   </p:timing>
 </p:sld>
 </file>
@@ -6310,11 +8871,7 @@
             </a:r>
             <a:r>
               <a:rPr lang="de-DE" dirty="0" smtClean="0"/>
-              <a:t>vs</a:t>
-            </a:r>
-            <a:r>
-              <a:rPr lang="de-DE" dirty="0" smtClean="0"/>
-              <a:t>. </a:t>
+              <a:t>vs. </a:t>
             </a:r>
             <a:r>
               <a:rPr lang="de-DE" dirty="0" smtClean="0">

</xml_diff>

<commit_message>
Finished GFS slides. Merged GFS and HDFS. Started with similarities.
</commit_message>
<xml_diff>
--- a/Presentation/DistributedFileSystems_Daniel.pptx
+++ b/Presentation/DistributedFileSystems_Daniel.pptx
@@ -208,7 +208,7 @@
           <a:p>
             <a:fld id="{78BE29F3-6F59-4618-8DD2-3442BAF97DCD}" type="datetimeFigureOut">
               <a:rPr lang="de-DE" smtClean="0"/>
-              <a:t>21.04.2015</a:t>
+              <a:t>22.04.2015</a:t>
             </a:fld>
             <a:endParaRPr lang="de-DE"/>
           </a:p>
@@ -5861,272 +5861,560 @@
         </p:nvSpPr>
         <p:spPr/>
         <p:txBody>
-          <a:bodyPr/>
-          <a:lstStyle/>
-          <a:p>
-            <a:r>
-              <a:rPr lang="de-DE" dirty="0" err="1" smtClean="0"/>
-              <a:t>Designed</a:t>
-            </a:r>
-            <a:r>
-              <a:rPr lang="de-DE" dirty="0" smtClean="0"/>
+          <a:bodyPr>
+            <a:normAutofit/>
+          </a:bodyPr>
+          <a:lstStyle/>
+          <a:p>
+            <a:pPr>
+              <a:lnSpc>
+                <a:spcPct val="100000"/>
+              </a:lnSpc>
+              <a:spcBef>
+                <a:spcPts val="0"/>
+              </a:spcBef>
+            </a:pPr>
+            <a:r>
+              <a:rPr lang="de-DE" dirty="0" smtClean="0">
+                <a:solidFill>
+                  <a:schemeClr val="accent6"/>
+                </a:solidFill>
+              </a:rPr>
+              <a:t>Large </a:t>
+            </a:r>
+            <a:r>
+              <a:rPr lang="de-DE" dirty="0" err="1" smtClean="0">
+                <a:solidFill>
+                  <a:schemeClr val="accent6"/>
+                </a:solidFill>
+              </a:rPr>
+              <a:t>files</a:t>
+            </a:r>
+            <a:r>
+              <a:rPr lang="de-DE" dirty="0" smtClean="0">
+                <a:solidFill>
+                  <a:schemeClr val="accent6"/>
+                </a:solidFill>
+              </a:rPr>
               <a:t> </a:t>
             </a:r>
             <a:r>
-              <a:rPr lang="de-DE" dirty="0" err="1" smtClean="0"/>
-              <a:t>for</a:t>
-            </a:r>
-            <a:r>
-              <a:rPr lang="de-DE" dirty="0" smtClean="0"/>
+              <a:rPr lang="de-DE" dirty="0">
+                <a:solidFill>
+                  <a:schemeClr val="accent6"/>
+                </a:solidFill>
+              </a:rPr>
+              <a:t>(100MB </a:t>
+            </a:r>
+            <a:r>
+              <a:rPr lang="de-DE" dirty="0" err="1">
+                <a:solidFill>
+                  <a:schemeClr val="accent6"/>
+                </a:solidFill>
+              </a:rPr>
+              <a:t>and</a:t>
+            </a:r>
+            <a:r>
+              <a:rPr lang="de-DE" dirty="0">
+                <a:solidFill>
+                  <a:schemeClr val="accent6"/>
+                </a:solidFill>
+              </a:rPr>
               <a:t> </a:t>
             </a:r>
             <a:r>
-              <a:rPr lang="de-DE" dirty="0" err="1" smtClean="0"/>
-              <a:t>environment</a:t>
-            </a:r>
-            <a:r>
-              <a:rPr lang="de-DE" dirty="0" smtClean="0"/>
+              <a:rPr lang="de-DE" dirty="0" err="1">
+                <a:solidFill>
+                  <a:schemeClr val="accent6"/>
+                </a:solidFill>
+              </a:rPr>
+              <a:t>more</a:t>
+            </a:r>
+            <a:r>
+              <a:rPr lang="de-DE" dirty="0" smtClean="0">
+                <a:solidFill>
+                  <a:schemeClr val="accent6"/>
+                </a:solidFill>
+              </a:rPr>
+              <a:t>)</a:t>
+            </a:r>
+            <a:endParaRPr lang="de-DE" dirty="0" smtClean="0">
+              <a:solidFill>
+                <a:schemeClr val="accent6"/>
+              </a:solidFill>
+            </a:endParaRPr>
+          </a:p>
+          <a:p>
+            <a:pPr>
+              <a:lnSpc>
+                <a:spcPct val="100000"/>
+              </a:lnSpc>
+              <a:spcBef>
+                <a:spcPts val="0"/>
+              </a:spcBef>
+            </a:pPr>
+            <a:r>
+              <a:rPr lang="de-DE" dirty="0" err="1" smtClean="0">
+                <a:solidFill>
+                  <a:schemeClr val="accent6"/>
+                </a:solidFill>
+              </a:rPr>
+              <a:t>Commodity</a:t>
+            </a:r>
+            <a:r>
+              <a:rPr lang="de-DE" dirty="0" smtClean="0">
+                <a:solidFill>
+                  <a:schemeClr val="accent6"/>
+                </a:solidFill>
+              </a:rPr>
               <a:t> </a:t>
             </a:r>
             <a:r>
-              <a:rPr lang="de-DE" dirty="0" err="1" smtClean="0"/>
-              <a:t>where</a:t>
-            </a:r>
-            <a:endParaRPr lang="de-DE" dirty="0" smtClean="0"/>
-          </a:p>
-          <a:p>
-            <a:pPr lvl="1"/>
-            <a:r>
-              <a:rPr lang="de-DE" dirty="0" err="1" smtClean="0"/>
-              <a:t>Component</a:t>
-            </a:r>
-            <a:r>
-              <a:rPr lang="de-DE" dirty="0" smtClean="0"/>
+              <a:rPr lang="de-DE" dirty="0" err="1" smtClean="0">
+                <a:solidFill>
+                  <a:schemeClr val="accent6"/>
+                </a:solidFill>
+              </a:rPr>
+              <a:t>hardware</a:t>
+            </a:r>
+            <a:r>
+              <a:rPr lang="de-DE" dirty="0" smtClean="0">
+                <a:solidFill>
+                  <a:schemeClr val="accent6"/>
+                </a:solidFill>
+              </a:rPr>
+              <a:t> (</a:t>
+            </a:r>
+            <a:r>
+              <a:rPr lang="de-DE" dirty="0" err="1" smtClean="0">
+                <a:solidFill>
+                  <a:schemeClr val="accent6"/>
+                </a:solidFill>
+              </a:rPr>
+              <a:t>failures</a:t>
+            </a:r>
+            <a:r>
+              <a:rPr lang="de-DE" dirty="0" smtClean="0">
+                <a:solidFill>
+                  <a:schemeClr val="accent6"/>
+                </a:solidFill>
+              </a:rPr>
               <a:t> </a:t>
             </a:r>
             <a:r>
-              <a:rPr lang="de-DE" dirty="0" err="1" smtClean="0"/>
-              <a:t>failures</a:t>
-            </a:r>
-            <a:r>
-              <a:rPr lang="de-DE" dirty="0" smtClean="0"/>
+              <a:rPr lang="de-DE" dirty="0" err="1" smtClean="0">
+                <a:solidFill>
+                  <a:schemeClr val="accent6"/>
+                </a:solidFill>
+              </a:rPr>
+              <a:t>are</a:t>
+            </a:r>
+            <a:r>
+              <a:rPr lang="de-DE" dirty="0" smtClean="0">
+                <a:solidFill>
+                  <a:schemeClr val="accent6"/>
+                </a:solidFill>
+              </a:rPr>
               <a:t> </a:t>
             </a:r>
             <a:r>
-              <a:rPr lang="de-DE" dirty="0" err="1" smtClean="0"/>
+              <a:rPr lang="de-DE" dirty="0" err="1" smtClean="0">
+                <a:solidFill>
+                  <a:schemeClr val="accent6"/>
+                </a:solidFill>
+              </a:rPr>
+              <a:t>the</a:t>
+            </a:r>
+            <a:r>
+              <a:rPr lang="de-DE" dirty="0" smtClean="0">
+                <a:solidFill>
+                  <a:schemeClr val="accent6"/>
+                </a:solidFill>
+              </a:rPr>
+              <a:t> </a:t>
+            </a:r>
+            <a:r>
+              <a:rPr lang="de-DE" dirty="0" smtClean="0">
+                <a:solidFill>
+                  <a:schemeClr val="accent6"/>
+                </a:solidFill>
+              </a:rPr>
+              <a:t>norm)</a:t>
+            </a:r>
+            <a:endParaRPr lang="de-DE" dirty="0" smtClean="0">
+              <a:solidFill>
+                <a:schemeClr val="accent6"/>
+              </a:solidFill>
+            </a:endParaRPr>
+          </a:p>
+          <a:p>
+            <a:pPr>
+              <a:lnSpc>
+                <a:spcPct val="100000"/>
+              </a:lnSpc>
+              <a:spcBef>
+                <a:spcPts val="0"/>
+              </a:spcBef>
+            </a:pPr>
+            <a:r>
+              <a:rPr lang="de-DE" dirty="0" smtClean="0">
+                <a:solidFill>
+                  <a:schemeClr val="accent6"/>
+                </a:solidFill>
+              </a:rPr>
+              <a:t>(</a:t>
+            </a:r>
+            <a:r>
+              <a:rPr lang="de-DE" dirty="0" err="1" smtClean="0">
+                <a:solidFill>
+                  <a:schemeClr val="accent6"/>
+                </a:solidFill>
+              </a:rPr>
+              <a:t>C</a:t>
+            </a:r>
+            <a:r>
+              <a:rPr lang="de-DE" dirty="0" err="1" smtClean="0">
+                <a:solidFill>
+                  <a:schemeClr val="accent6"/>
+                </a:solidFill>
+              </a:rPr>
+              <a:t>oncurrently</a:t>
+            </a:r>
+            <a:r>
+              <a:rPr lang="de-DE" dirty="0" smtClean="0">
+                <a:solidFill>
+                  <a:schemeClr val="accent6"/>
+                </a:solidFill>
+              </a:rPr>
+              <a:t>) </a:t>
+            </a:r>
+            <a:r>
+              <a:rPr lang="de-DE" dirty="0" err="1" smtClean="0">
+                <a:solidFill>
+                  <a:schemeClr val="accent6"/>
+                </a:solidFill>
+              </a:rPr>
+              <a:t>a</a:t>
+            </a:r>
+            <a:r>
+              <a:rPr lang="de-DE" dirty="0" err="1" smtClean="0">
+                <a:solidFill>
+                  <a:schemeClr val="accent6"/>
+                </a:solidFill>
+              </a:rPr>
+              <a:t>ppending</a:t>
+            </a:r>
+            <a:r>
+              <a:rPr lang="de-DE" dirty="0" smtClean="0">
+                <a:solidFill>
+                  <a:schemeClr val="accent6"/>
+                </a:solidFill>
+              </a:rPr>
+              <a:t> </a:t>
+            </a:r>
+            <a:r>
+              <a:rPr lang="de-DE" dirty="0" err="1" smtClean="0">
+                <a:solidFill>
+                  <a:schemeClr val="accent6"/>
+                </a:solidFill>
+              </a:rPr>
+              <a:t>files</a:t>
+            </a:r>
+            <a:endParaRPr lang="de-DE" dirty="0" smtClean="0">
+              <a:solidFill>
+                <a:schemeClr val="accent6"/>
+              </a:solidFill>
+            </a:endParaRPr>
+          </a:p>
+          <a:p>
+            <a:pPr>
+              <a:lnSpc>
+                <a:spcPct val="100000"/>
+              </a:lnSpc>
+              <a:spcBef>
+                <a:spcPts val="0"/>
+              </a:spcBef>
+            </a:pPr>
+            <a:r>
+              <a:rPr lang="de-DE" dirty="0" smtClean="0">
+                <a:solidFill>
+                  <a:schemeClr val="accent6"/>
+                </a:solidFill>
+              </a:rPr>
+              <a:t>Files </a:t>
+            </a:r>
+            <a:r>
+              <a:rPr lang="de-DE" dirty="0" err="1" smtClean="0">
+                <a:solidFill>
+                  <a:schemeClr val="accent6"/>
+                </a:solidFill>
+              </a:rPr>
               <a:t>are</a:t>
             </a:r>
             <a:r>
-              <a:rPr lang="de-DE" dirty="0" smtClean="0"/>
+              <a:rPr lang="de-DE" dirty="0" smtClean="0">
+                <a:solidFill>
+                  <a:schemeClr val="accent6"/>
+                </a:solidFill>
+              </a:rPr>
               <a:t> </a:t>
             </a:r>
             <a:r>
-              <a:rPr lang="de-DE" dirty="0" err="1" smtClean="0"/>
-              <a:t>the</a:t>
-            </a:r>
-            <a:r>
-              <a:rPr lang="de-DE" dirty="0" smtClean="0"/>
-              <a:t> norm</a:t>
-            </a:r>
-          </a:p>
-          <a:p>
-            <a:pPr lvl="1"/>
-            <a:r>
-              <a:rPr lang="de-DE" dirty="0" smtClean="0"/>
-              <a:t>Files </a:t>
-            </a:r>
-            <a:r>
-              <a:rPr lang="de-DE" dirty="0" err="1" smtClean="0"/>
-              <a:t>are</a:t>
-            </a:r>
-            <a:r>
-              <a:rPr lang="de-DE" dirty="0" smtClean="0"/>
+              <a:rPr lang="de-DE" dirty="0" err="1" smtClean="0">
+                <a:solidFill>
+                  <a:schemeClr val="accent6"/>
+                </a:solidFill>
+              </a:rPr>
+              <a:t>mostly</a:t>
+            </a:r>
+            <a:r>
+              <a:rPr lang="de-DE" dirty="0" smtClean="0">
+                <a:solidFill>
+                  <a:schemeClr val="accent6"/>
+                </a:solidFill>
+              </a:rPr>
               <a:t> </a:t>
             </a:r>
             <a:r>
-              <a:rPr lang="de-DE" dirty="0" err="1" smtClean="0"/>
-              <a:t>huge</a:t>
-            </a:r>
-            <a:r>
-              <a:rPr lang="de-DE" dirty="0" smtClean="0"/>
-              <a:t> (100MB </a:t>
-            </a:r>
-            <a:r>
-              <a:rPr lang="de-DE" dirty="0" err="1" smtClean="0"/>
-              <a:t>and</a:t>
-            </a:r>
-            <a:r>
-              <a:rPr lang="de-DE" dirty="0" smtClean="0"/>
+              <a:rPr lang="de-DE" dirty="0" err="1" smtClean="0">
+                <a:solidFill>
+                  <a:schemeClr val="accent6"/>
+                </a:solidFill>
+              </a:rPr>
+              <a:t>read</a:t>
+            </a:r>
+            <a:r>
+              <a:rPr lang="de-DE" dirty="0" smtClean="0">
+                <a:solidFill>
+                  <a:schemeClr val="accent6"/>
+                </a:solidFill>
+              </a:rPr>
               <a:t> </a:t>
             </a:r>
             <a:r>
-              <a:rPr lang="de-DE" dirty="0" err="1" smtClean="0"/>
-              <a:t>more</a:t>
-            </a:r>
-            <a:r>
-              <a:rPr lang="de-DE" dirty="0" smtClean="0"/>
-              <a:t>)</a:t>
-            </a:r>
-          </a:p>
-          <a:p>
-            <a:pPr lvl="1"/>
-            <a:r>
-              <a:rPr lang="de-DE" dirty="0" smtClean="0"/>
-              <a:t>Files </a:t>
-            </a:r>
-            <a:r>
-              <a:rPr lang="de-DE" dirty="0" err="1" smtClean="0"/>
-              <a:t>usually</a:t>
-            </a:r>
-            <a:r>
-              <a:rPr lang="de-DE" dirty="0" smtClean="0"/>
-              <a:t> do not </a:t>
-            </a:r>
-            <a:r>
-              <a:rPr lang="de-DE" dirty="0" err="1" smtClean="0"/>
-              <a:t>change</a:t>
-            </a:r>
-            <a:r>
-              <a:rPr lang="de-DE" dirty="0" smtClean="0"/>
-              <a:t> (</a:t>
-            </a:r>
-            <a:r>
-              <a:rPr lang="de-DE" dirty="0" err="1" smtClean="0"/>
-              <a:t>written</a:t>
-            </a:r>
-            <a:r>
-              <a:rPr lang="de-DE" dirty="0" smtClean="0"/>
+              <a:rPr lang="de-DE" dirty="0" err="1" smtClean="0">
+                <a:solidFill>
+                  <a:schemeClr val="accent6"/>
+                </a:solidFill>
+              </a:rPr>
+              <a:t>sequentially</a:t>
+            </a:r>
+            <a:endParaRPr lang="de-DE" dirty="0" smtClean="0">
+              <a:solidFill>
+                <a:schemeClr val="accent6"/>
+              </a:solidFill>
+            </a:endParaRPr>
+          </a:p>
+          <a:p>
+            <a:pPr>
+              <a:lnSpc>
+                <a:spcPct val="100000"/>
+              </a:lnSpc>
+              <a:spcBef>
+                <a:spcPts val="0"/>
+              </a:spcBef>
+            </a:pPr>
+            <a:r>
+              <a:rPr lang="de-DE" dirty="0" smtClean="0">
+                <a:solidFill>
+                  <a:schemeClr val="accent6"/>
+                </a:solidFill>
+              </a:rPr>
+              <a:t>High </a:t>
+            </a:r>
+            <a:r>
+              <a:rPr lang="de-DE" dirty="0" err="1" smtClean="0">
+                <a:solidFill>
+                  <a:schemeClr val="accent6"/>
+                </a:solidFill>
+              </a:rPr>
+              <a:t>data</a:t>
+            </a:r>
+            <a:r>
+              <a:rPr lang="de-DE" dirty="0" smtClean="0">
+                <a:solidFill>
+                  <a:schemeClr val="accent6"/>
+                </a:solidFill>
+              </a:rPr>
               <a:t> </a:t>
             </a:r>
             <a:r>
-              <a:rPr lang="de-DE" dirty="0" err="1" smtClean="0"/>
-              <a:t>once</a:t>
-            </a:r>
-            <a:r>
-              <a:rPr lang="de-DE" dirty="0"/>
-              <a:t>)</a:t>
-            </a:r>
-            <a:endParaRPr lang="de-DE" dirty="0" smtClean="0"/>
-          </a:p>
-          <a:p>
-            <a:pPr lvl="1"/>
-            <a:r>
-              <a:rPr lang="de-DE" dirty="0" err="1" smtClean="0"/>
-              <a:t>If</a:t>
-            </a:r>
-            <a:r>
-              <a:rPr lang="de-DE" dirty="0" smtClean="0"/>
+              <a:rPr lang="de-DE" dirty="0" err="1" smtClean="0">
+                <a:solidFill>
+                  <a:schemeClr val="accent6"/>
+                </a:solidFill>
+              </a:rPr>
+              <a:t>throughput</a:t>
+            </a:r>
+            <a:endParaRPr lang="de-DE" dirty="0" smtClean="0">
+              <a:solidFill>
+                <a:schemeClr val="accent6"/>
+              </a:solidFill>
+            </a:endParaRPr>
+          </a:p>
+          <a:p>
+            <a:pPr>
+              <a:lnSpc>
+                <a:spcPct val="100000"/>
+              </a:lnSpc>
+              <a:spcBef>
+                <a:spcPts val="0"/>
+              </a:spcBef>
+            </a:pPr>
+            <a:r>
+              <a:rPr lang="de-DE" dirty="0" smtClean="0">
+                <a:solidFill>
+                  <a:srgbClr val="C00000"/>
+                </a:solidFill>
+              </a:rPr>
+              <a:t>Small </a:t>
+            </a:r>
+            <a:r>
+              <a:rPr lang="de-DE" dirty="0" err="1" smtClean="0">
+                <a:solidFill>
+                  <a:srgbClr val="C00000"/>
+                </a:solidFill>
+              </a:rPr>
+              <a:t>files</a:t>
+            </a:r>
+            <a:endParaRPr lang="de-DE" dirty="0">
+              <a:solidFill>
+                <a:srgbClr val="C00000"/>
+              </a:solidFill>
+            </a:endParaRPr>
+          </a:p>
+          <a:p>
+            <a:pPr>
+              <a:lnSpc>
+                <a:spcPct val="100000"/>
+              </a:lnSpc>
+              <a:spcBef>
+                <a:spcPts val="0"/>
+              </a:spcBef>
+            </a:pPr>
+            <a:r>
+              <a:rPr lang="de-DE" dirty="0" err="1">
+                <a:solidFill>
+                  <a:srgbClr val="C00000"/>
+                </a:solidFill>
+              </a:rPr>
+              <a:t>Modifying</a:t>
+            </a:r>
+            <a:r>
+              <a:rPr lang="de-DE" dirty="0">
+                <a:solidFill>
+                  <a:srgbClr val="C00000"/>
+                </a:solidFill>
+              </a:rPr>
+              <a:t> (not </a:t>
+            </a:r>
+            <a:r>
+              <a:rPr lang="de-DE" dirty="0" err="1">
+                <a:solidFill>
+                  <a:srgbClr val="C00000"/>
+                </a:solidFill>
+              </a:rPr>
+              <a:t>appending</a:t>
+            </a:r>
+            <a:r>
+              <a:rPr lang="de-DE" dirty="0">
+                <a:solidFill>
+                  <a:srgbClr val="C00000"/>
+                </a:solidFill>
+              </a:rPr>
+              <a:t>) </a:t>
+            </a:r>
+            <a:r>
+              <a:rPr lang="de-DE" dirty="0" err="1" smtClean="0">
+                <a:solidFill>
+                  <a:srgbClr val="C00000"/>
+                </a:solidFill>
+              </a:rPr>
+              <a:t>writes</a:t>
+            </a:r>
+            <a:endParaRPr lang="de-DE" dirty="0" smtClean="0">
+              <a:solidFill>
+                <a:srgbClr val="C00000"/>
+              </a:solidFill>
+            </a:endParaRPr>
+          </a:p>
+          <a:p>
+            <a:pPr>
+              <a:lnSpc>
+                <a:spcPct val="100000"/>
+              </a:lnSpc>
+              <a:spcBef>
+                <a:spcPts val="0"/>
+              </a:spcBef>
+            </a:pPr>
+            <a:r>
+              <a:rPr lang="de-DE" dirty="0" smtClean="0">
+                <a:solidFill>
+                  <a:srgbClr val="C00000"/>
+                </a:solidFill>
+              </a:rPr>
+              <a:t>Small </a:t>
+            </a:r>
+            <a:r>
+              <a:rPr lang="de-DE" dirty="0" err="1" smtClean="0">
+                <a:solidFill>
+                  <a:srgbClr val="C00000"/>
+                </a:solidFill>
+              </a:rPr>
+              <a:t>random</a:t>
+            </a:r>
+            <a:r>
+              <a:rPr lang="de-DE" dirty="0" smtClean="0">
+                <a:solidFill>
+                  <a:srgbClr val="C00000"/>
+                </a:solidFill>
+              </a:rPr>
               <a:t> </a:t>
             </a:r>
             <a:r>
-              <a:rPr lang="de-DE" dirty="0" err="1" smtClean="0"/>
-              <a:t>they</a:t>
-            </a:r>
-            <a:r>
-              <a:rPr lang="de-DE" dirty="0" smtClean="0"/>
-              <a:t> </a:t>
-            </a:r>
-            <a:r>
-              <a:rPr lang="de-DE" dirty="0" err="1" smtClean="0"/>
-              <a:t>change</a:t>
-            </a:r>
-            <a:r>
-              <a:rPr lang="de-DE" dirty="0" smtClean="0"/>
-              <a:t>, </a:t>
-            </a:r>
-            <a:r>
-              <a:rPr lang="de-DE" dirty="0" err="1" smtClean="0"/>
-              <a:t>changes</a:t>
-            </a:r>
-            <a:r>
-              <a:rPr lang="de-DE" dirty="0" smtClean="0"/>
-              <a:t> </a:t>
-            </a:r>
-            <a:r>
-              <a:rPr lang="de-DE" dirty="0" err="1" smtClean="0"/>
-              <a:t>are</a:t>
-            </a:r>
-            <a:r>
-              <a:rPr lang="de-DE" dirty="0" smtClean="0"/>
-              <a:t> </a:t>
-            </a:r>
-            <a:r>
-              <a:rPr lang="de-DE" dirty="0" err="1" smtClean="0"/>
-              <a:t>appended</a:t>
-            </a:r>
-            <a:endParaRPr lang="de-DE" dirty="0" smtClean="0"/>
-          </a:p>
-          <a:p>
-            <a:pPr lvl="1"/>
-            <a:r>
-              <a:rPr lang="de-DE" dirty="0" smtClean="0"/>
-              <a:t>Files </a:t>
-            </a:r>
-            <a:r>
-              <a:rPr lang="de-DE" dirty="0" err="1" smtClean="0"/>
-              <a:t>are</a:t>
-            </a:r>
-            <a:r>
-              <a:rPr lang="de-DE" dirty="0" smtClean="0"/>
-              <a:t> </a:t>
-            </a:r>
-            <a:r>
-              <a:rPr lang="de-DE" dirty="0" err="1" smtClean="0"/>
-              <a:t>mostly</a:t>
-            </a:r>
-            <a:r>
-              <a:rPr lang="de-DE" dirty="0" smtClean="0"/>
-              <a:t> </a:t>
-            </a:r>
-            <a:r>
-              <a:rPr lang="de-DE" dirty="0" err="1" smtClean="0"/>
-              <a:t>read</a:t>
-            </a:r>
-            <a:r>
-              <a:rPr lang="de-DE" dirty="0" smtClean="0"/>
-              <a:t> </a:t>
-            </a:r>
-            <a:r>
-              <a:rPr lang="de-DE" dirty="0" err="1" smtClean="0"/>
-              <a:t>sequentially</a:t>
-            </a:r>
-            <a:endParaRPr lang="de-DE" dirty="0" smtClean="0"/>
-          </a:p>
-          <a:p>
-            <a:pPr lvl="1"/>
-            <a:r>
-              <a:rPr lang="de-DE" dirty="0" smtClean="0"/>
+              <a:rPr lang="de-DE" dirty="0" err="1" smtClean="0">
+                <a:solidFill>
+                  <a:srgbClr val="C00000"/>
+                </a:solidFill>
+              </a:rPr>
+              <a:t>reads</a:t>
+            </a:r>
+            <a:endParaRPr lang="de-DE" dirty="0" smtClean="0">
+              <a:solidFill>
+                <a:srgbClr val="C00000"/>
+              </a:solidFill>
+            </a:endParaRPr>
+          </a:p>
+          <a:p>
+            <a:pPr>
+              <a:lnSpc>
+                <a:spcPct val="100000"/>
+              </a:lnSpc>
+              <a:spcBef>
+                <a:spcPts val="0"/>
+              </a:spcBef>
+            </a:pPr>
+            <a:r>
+              <a:rPr lang="de-DE" dirty="0" smtClean="0">
+                <a:solidFill>
+                  <a:srgbClr val="C00000"/>
+                </a:solidFill>
+              </a:rPr>
               <a:t>High </a:t>
             </a:r>
             <a:r>
-              <a:rPr lang="de-DE" dirty="0" err="1" smtClean="0"/>
-              <a:t>data</a:t>
-            </a:r>
-            <a:r>
-              <a:rPr lang="de-DE" dirty="0" smtClean="0"/>
-              <a:t> </a:t>
-            </a:r>
-            <a:r>
-              <a:rPr lang="de-DE" dirty="0" err="1" smtClean="0"/>
-              <a:t>throughput</a:t>
-            </a:r>
-            <a:r>
-              <a:rPr lang="de-DE" dirty="0"/>
-              <a:t> </a:t>
-            </a:r>
-            <a:r>
-              <a:rPr lang="de-DE" dirty="0" err="1" smtClean="0"/>
-              <a:t>is</a:t>
-            </a:r>
-            <a:r>
-              <a:rPr lang="de-DE" dirty="0" smtClean="0"/>
-              <a:t> </a:t>
-            </a:r>
-            <a:r>
-              <a:rPr lang="de-DE" dirty="0" err="1" smtClean="0"/>
-              <a:t>important</a:t>
-            </a:r>
-            <a:endParaRPr lang="de-DE" dirty="0"/>
+              <a:rPr lang="de-DE" dirty="0" err="1" smtClean="0">
+                <a:solidFill>
+                  <a:srgbClr val="C00000"/>
+                </a:solidFill>
+              </a:rPr>
+              <a:t>latency</a:t>
+            </a:r>
+            <a:endParaRPr lang="de-DE" dirty="0">
+              <a:solidFill>
+                <a:srgbClr val="C00000"/>
+              </a:solidFill>
+            </a:endParaRPr>
           </a:p>
           <a:p>
             <a:pPr lvl="1"/>
@@ -6199,7 +6487,226 @@
   <p:timing>
     <p:tnLst>
       <p:par>
-        <p:cTn id="1" dur="indefinite" restart="never" nodeType="tmRoot"/>
+        <p:cTn id="1" dur="indefinite" restart="never" nodeType="tmRoot">
+          <p:childTnLst>
+            <p:seq concurrent="1" nextAc="seek">
+              <p:cTn id="2" dur="indefinite" nodeType="mainSeq">
+                <p:childTnLst>
+                  <p:par>
+                    <p:cTn id="3" fill="hold">
+                      <p:stCondLst>
+                        <p:cond delay="indefinite"/>
+                      </p:stCondLst>
+                      <p:childTnLst>
+                        <p:par>
+                          <p:cTn id="4" fill="hold">
+                            <p:stCondLst>
+                              <p:cond delay="0"/>
+                            </p:stCondLst>
+                            <p:childTnLst>
+                              <p:par>
+                                <p:cTn id="5" presetID="1" presetClass="entr" presetSubtype="0" fill="hold" nodeType="clickEffect">
+                                  <p:stCondLst>
+                                    <p:cond delay="0"/>
+                                  </p:stCondLst>
+                                  <p:childTnLst>
+                                    <p:set>
+                                      <p:cBhvr>
+                                        <p:cTn id="6" dur="1" fill="hold">
+                                          <p:stCondLst>
+                                            <p:cond delay="0"/>
+                                          </p:stCondLst>
+                                        </p:cTn>
+                                        <p:tgtEl>
+                                          <p:spTgt spid="3">
+                                            <p:txEl>
+                                              <p:pRg st="5" end="5"/>
+                                            </p:txEl>
+                                          </p:spTgt>
+                                        </p:tgtEl>
+                                        <p:attrNameLst>
+                                          <p:attrName>style.visibility</p:attrName>
+                                        </p:attrNameLst>
+                                      </p:cBhvr>
+                                      <p:to>
+                                        <p:strVal val="visible"/>
+                                      </p:to>
+                                    </p:set>
+                                  </p:childTnLst>
+                                </p:cTn>
+                              </p:par>
+                            </p:childTnLst>
+                          </p:cTn>
+                        </p:par>
+                      </p:childTnLst>
+                    </p:cTn>
+                  </p:par>
+                  <p:par>
+                    <p:cTn id="7" fill="hold">
+                      <p:stCondLst>
+                        <p:cond delay="indefinite"/>
+                      </p:stCondLst>
+                      <p:childTnLst>
+                        <p:par>
+                          <p:cTn id="8" fill="hold">
+                            <p:stCondLst>
+                              <p:cond delay="0"/>
+                            </p:stCondLst>
+                            <p:childTnLst>
+                              <p:par>
+                                <p:cTn id="9" presetID="1" presetClass="entr" presetSubtype="0" fill="hold" nodeType="clickEffect">
+                                  <p:stCondLst>
+                                    <p:cond delay="0"/>
+                                  </p:stCondLst>
+                                  <p:childTnLst>
+                                    <p:set>
+                                      <p:cBhvr>
+                                        <p:cTn id="10" dur="1" fill="hold">
+                                          <p:stCondLst>
+                                            <p:cond delay="0"/>
+                                          </p:stCondLst>
+                                        </p:cTn>
+                                        <p:tgtEl>
+                                          <p:spTgt spid="3">
+                                            <p:txEl>
+                                              <p:pRg st="6" end="6"/>
+                                            </p:txEl>
+                                          </p:spTgt>
+                                        </p:tgtEl>
+                                        <p:attrNameLst>
+                                          <p:attrName>style.visibility</p:attrName>
+                                        </p:attrNameLst>
+                                      </p:cBhvr>
+                                      <p:to>
+                                        <p:strVal val="visible"/>
+                                      </p:to>
+                                    </p:set>
+                                  </p:childTnLst>
+                                </p:cTn>
+                              </p:par>
+                            </p:childTnLst>
+                          </p:cTn>
+                        </p:par>
+                      </p:childTnLst>
+                    </p:cTn>
+                  </p:par>
+                  <p:par>
+                    <p:cTn id="11" fill="hold">
+                      <p:stCondLst>
+                        <p:cond delay="indefinite"/>
+                      </p:stCondLst>
+                      <p:childTnLst>
+                        <p:par>
+                          <p:cTn id="12" fill="hold">
+                            <p:stCondLst>
+                              <p:cond delay="0"/>
+                            </p:stCondLst>
+                            <p:childTnLst>
+                              <p:par>
+                                <p:cTn id="13" presetID="1" presetClass="entr" presetSubtype="0" fill="hold" nodeType="clickEffect">
+                                  <p:stCondLst>
+                                    <p:cond delay="0"/>
+                                  </p:stCondLst>
+                                  <p:childTnLst>
+                                    <p:set>
+                                      <p:cBhvr>
+                                        <p:cTn id="14" dur="1" fill="hold">
+                                          <p:stCondLst>
+                                            <p:cond delay="0"/>
+                                          </p:stCondLst>
+                                        </p:cTn>
+                                        <p:tgtEl>
+                                          <p:spTgt spid="3">
+                                            <p:txEl>
+                                              <p:pRg st="7" end="7"/>
+                                            </p:txEl>
+                                          </p:spTgt>
+                                        </p:tgtEl>
+                                        <p:attrNameLst>
+                                          <p:attrName>style.visibility</p:attrName>
+                                        </p:attrNameLst>
+                                      </p:cBhvr>
+                                      <p:to>
+                                        <p:strVal val="visible"/>
+                                      </p:to>
+                                    </p:set>
+                                  </p:childTnLst>
+                                </p:cTn>
+                              </p:par>
+                            </p:childTnLst>
+                          </p:cTn>
+                        </p:par>
+                      </p:childTnLst>
+                    </p:cTn>
+                  </p:par>
+                  <p:par>
+                    <p:cTn id="15" fill="hold">
+                      <p:stCondLst>
+                        <p:cond delay="indefinite"/>
+                      </p:stCondLst>
+                      <p:childTnLst>
+                        <p:par>
+                          <p:cTn id="16" fill="hold">
+                            <p:stCondLst>
+                              <p:cond delay="0"/>
+                            </p:stCondLst>
+                            <p:childTnLst>
+                              <p:par>
+                                <p:cTn id="17" presetID="1" presetClass="entr" presetSubtype="0" fill="hold" nodeType="clickEffect">
+                                  <p:stCondLst>
+                                    <p:cond delay="0"/>
+                                  </p:stCondLst>
+                                  <p:childTnLst>
+                                    <p:set>
+                                      <p:cBhvr>
+                                        <p:cTn id="18" dur="1" fill="hold">
+                                          <p:stCondLst>
+                                            <p:cond delay="0"/>
+                                          </p:stCondLst>
+                                        </p:cTn>
+                                        <p:tgtEl>
+                                          <p:spTgt spid="3">
+                                            <p:txEl>
+                                              <p:pRg st="8" end="8"/>
+                                            </p:txEl>
+                                          </p:spTgt>
+                                        </p:tgtEl>
+                                        <p:attrNameLst>
+                                          <p:attrName>style.visibility</p:attrName>
+                                        </p:attrNameLst>
+                                      </p:cBhvr>
+                                      <p:to>
+                                        <p:strVal val="visible"/>
+                                      </p:to>
+                                    </p:set>
+                                  </p:childTnLst>
+                                </p:cTn>
+                              </p:par>
+                            </p:childTnLst>
+                          </p:cTn>
+                        </p:par>
+                      </p:childTnLst>
+                    </p:cTn>
+                  </p:par>
+                </p:childTnLst>
+              </p:cTn>
+              <p:prevCondLst>
+                <p:cond evt="onPrev" delay="0">
+                  <p:tgtEl>
+                    <p:sldTgt/>
+                  </p:tgtEl>
+                </p:cond>
+              </p:prevCondLst>
+              <p:nextCondLst>
+                <p:cond evt="onNext" delay="0">
+                  <p:tgtEl>
+                    <p:sldTgt/>
+                  </p:tgtEl>
+                </p:cond>
+              </p:nextCondLst>
+            </p:seq>
+          </p:childTnLst>
+        </p:cTn>
       </p:par>
     </p:tnLst>
   </p:timing>
@@ -6486,7 +6993,7 @@
         </p:nvSpPr>
         <p:spPr>
           <a:xfrm>
-            <a:off x="7339584" y="3469521"/>
+            <a:off x="7339584" y="3857442"/>
             <a:ext cx="3340608" cy="1107996"/>
           </a:xfrm>
           <a:prstGeom prst="rect">
@@ -6574,8 +7081,8 @@
         </p:nvSpPr>
         <p:spPr>
           <a:xfrm>
-            <a:off x="7339584" y="1761641"/>
-            <a:ext cx="2773680" cy="1631216"/>
+            <a:off x="7339583" y="1719755"/>
+            <a:ext cx="2340125" cy="1908215"/>
           </a:xfrm>
           <a:prstGeom prst="rect">
             <a:avLst/>
@@ -6592,6 +7099,10 @@
               <a:rPr lang="de-DE" dirty="0" err="1" smtClean="0"/>
               <a:t>Chunkserver</a:t>
             </a:r>
+            <a:r>
+              <a:rPr lang="de-DE" dirty="0" smtClean="0"/>
+              <a:t> 1</a:t>
+            </a:r>
             <a:endParaRPr lang="de-DE" dirty="0" smtClean="0"/>
           </a:p>
           <a:p>
@@ -6606,21 +7117,21 @@
           </a:p>
           <a:p>
             <a:r>
+              <a:rPr lang="de-DE" sz="1600" b="1" dirty="0" err="1" smtClean="0"/>
+              <a:t>Chunk</a:t>
+            </a:r>
+            <a:r>
+              <a:rPr lang="de-DE" sz="1600" b="1" dirty="0" smtClean="0"/>
+              <a:t> d</a:t>
+            </a:r>
+          </a:p>
+          <a:p>
+            <a:r>
               <a:rPr lang="de-DE" sz="1600" dirty="0" err="1" smtClean="0"/>
               <a:t>Chunk</a:t>
             </a:r>
             <a:r>
               <a:rPr lang="de-DE" sz="1600" dirty="0" smtClean="0"/>
-              <a:t> d</a:t>
-            </a:r>
-          </a:p>
-          <a:p>
-            <a:r>
-              <a:rPr lang="de-DE" sz="1600" dirty="0" err="1" smtClean="0"/>
-              <a:t>Chunk</a:t>
-            </a:r>
-            <a:r>
-              <a:rPr lang="de-DE" sz="1600" dirty="0" smtClean="0"/>
               <a:t> k</a:t>
             </a:r>
           </a:p>
@@ -6631,6 +7142,29 @@
             </a:r>
           </a:p>
           <a:p>
+            <a:endParaRPr lang="de-DE" dirty="0" smtClean="0"/>
+          </a:p>
+          <a:p>
+            <a:r>
+              <a:rPr lang="de-DE" dirty="0" err="1" smtClean="0"/>
+              <a:t>Chunk</a:t>
+            </a:r>
+            <a:r>
+              <a:rPr lang="de-DE" dirty="0" smtClean="0"/>
+              <a:t>: 64MB </a:t>
+            </a:r>
+            <a:r>
+              <a:rPr lang="de-DE" dirty="0" err="1" smtClean="0"/>
+              <a:t>of</a:t>
+            </a:r>
+            <a:r>
+              <a:rPr lang="de-DE" dirty="0" smtClean="0"/>
+              <a:t> </a:t>
+            </a:r>
+            <a:r>
+              <a:rPr lang="de-DE" dirty="0" err="1" smtClean="0"/>
+              <a:t>data</a:t>
+            </a:r>
             <a:endParaRPr lang="de-DE" dirty="0"/>
           </a:p>
         </p:txBody>
@@ -7038,6 +7572,94 @@
           </a:p>
         </p:txBody>
       </p:sp>
+      <p:sp>
+        <p:nvSpPr>
+          <p:cNvPr id="23" name="Textfeld 22"/>
+          <p:cNvSpPr txBox="1"/>
+          <p:nvPr/>
+        </p:nvSpPr>
+        <p:spPr>
+          <a:xfrm>
+            <a:off x="8990316" y="1690688"/>
+            <a:ext cx="1839228" cy="1631216"/>
+          </a:xfrm>
+          <a:prstGeom prst="rect">
+            <a:avLst/>
+          </a:prstGeom>
+          <a:noFill/>
+        </p:spPr>
+        <p:txBody>
+          <a:bodyPr wrap="square" rtlCol="0">
+            <a:spAutoFit/>
+          </a:bodyPr>
+          <a:lstStyle/>
+          <a:p>
+            <a:r>
+              <a:rPr lang="de-DE" dirty="0" err="1" smtClean="0"/>
+              <a:t>Chunkserver</a:t>
+            </a:r>
+            <a:r>
+              <a:rPr lang="de-DE" dirty="0" smtClean="0"/>
+              <a:t> 2</a:t>
+            </a:r>
+            <a:endParaRPr lang="de-DE" dirty="0" smtClean="0"/>
+          </a:p>
+          <a:p>
+            <a:r>
+              <a:rPr lang="de-DE" sz="1600" dirty="0" err="1" smtClean="0"/>
+              <a:t>Chunk</a:t>
+            </a:r>
+            <a:r>
+              <a:rPr lang="de-DE" sz="1600" dirty="0" smtClean="0"/>
+              <a:t> </a:t>
+            </a:r>
+            <a:r>
+              <a:rPr lang="de-DE" sz="1600" dirty="0" smtClean="0"/>
+              <a:t>b</a:t>
+            </a:r>
+            <a:endParaRPr lang="de-DE" sz="1600" dirty="0" smtClean="0"/>
+          </a:p>
+          <a:p>
+            <a:r>
+              <a:rPr lang="de-DE" sz="1600" b="1" dirty="0" err="1" smtClean="0"/>
+              <a:t>Chunk</a:t>
+            </a:r>
+            <a:r>
+              <a:rPr lang="de-DE" sz="1600" b="1" dirty="0" smtClean="0"/>
+              <a:t> </a:t>
+            </a:r>
+            <a:r>
+              <a:rPr lang="de-DE" sz="1600" b="1" dirty="0"/>
+              <a:t>d</a:t>
+            </a:r>
+            <a:endParaRPr lang="de-DE" sz="1600" b="1" dirty="0" smtClean="0"/>
+          </a:p>
+          <a:p>
+            <a:r>
+              <a:rPr lang="de-DE" sz="1600" dirty="0" err="1" smtClean="0"/>
+              <a:t>Chunk</a:t>
+            </a:r>
+            <a:r>
+              <a:rPr lang="de-DE" sz="1600" dirty="0" smtClean="0"/>
+              <a:t> </a:t>
+            </a:r>
+            <a:r>
+              <a:rPr lang="de-DE" sz="1600" dirty="0"/>
+              <a:t>e</a:t>
+            </a:r>
+            <a:endParaRPr lang="de-DE" sz="1600" dirty="0" smtClean="0"/>
+          </a:p>
+          <a:p>
+            <a:r>
+              <a:rPr lang="de-DE" sz="1600" dirty="0" smtClean="0"/>
+              <a:t>…</a:t>
+            </a:r>
+          </a:p>
+          <a:p>
+            <a:endParaRPr lang="de-DE" dirty="0"/>
+          </a:p>
+        </p:txBody>
+      </p:sp>
     </p:spTree>
     <p:extLst>
       <p:ext uri="{BB962C8B-B14F-4D97-AF65-F5344CB8AC3E}">
@@ -7096,7 +7718,7 @@
                                 </p:cTn>
                               </p:par>
                               <p:par>
-                                <p:cTn id="7" presetID="1" presetClass="entr" presetSubtype="0" fill="hold" nodeType="withEffect">
+                                <p:cTn id="7" presetID="1" presetClass="entr" presetSubtype="0" fill="hold" grpId="0" nodeType="withEffect">
                                   <p:stCondLst>
                                     <p:cond delay="0"/>
                                   </p:stCondLst>
@@ -7109,7 +7731,7 @@
                                           </p:stCondLst>
                                         </p:cTn>
                                         <p:tgtEl>
-                                          <p:spTgt spid="10"/>
+                                          <p:spTgt spid="23"/>
                                         </p:tgtEl>
                                         <p:attrNameLst>
                                           <p:attrName>style.visibility</p:attrName>
@@ -7136,7 +7758,7 @@
                                           </p:stCondLst>
                                         </p:cTn>
                                         <p:tgtEl>
-                                          <p:spTgt spid="11"/>
+                                          <p:spTgt spid="10"/>
                                         </p:tgtEl>
                                         <p:attrNameLst>
                                           <p:attrName>style.visibility</p:attrName>
@@ -7163,6 +7785,33 @@
                                           </p:stCondLst>
                                         </p:cTn>
                                         <p:tgtEl>
+                                          <p:spTgt spid="11"/>
+                                        </p:tgtEl>
+                                        <p:attrNameLst>
+                                          <p:attrName>style.visibility</p:attrName>
+                                        </p:attrNameLst>
+                                      </p:cBhvr>
+                                      <p:to>
+                                        <p:strVal val="visible"/>
+                                      </p:to>
+                                    </p:set>
+                                  </p:childTnLst>
+                                </p:cTn>
+                              </p:par>
+                              <p:par>
+                                <p:cTn id="13" presetID="1" presetClass="entr" presetSubtype="0" fill="hold" nodeType="withEffect">
+                                  <p:stCondLst>
+                                    <p:cond delay="0"/>
+                                  </p:stCondLst>
+                                  <p:childTnLst>
+                                    <p:set>
+                                      <p:cBhvr>
+                                        <p:cTn id="14" dur="1" fill="hold">
+                                          <p:stCondLst>
+                                            <p:cond delay="0"/>
+                                          </p:stCondLst>
+                                        </p:cTn>
+                                        <p:tgtEl>
                                           <p:spTgt spid="12"/>
                                         </p:tgtEl>
                                         <p:attrNameLst>
@@ -7183,26 +7832,26 @@
                     </p:cTn>
                   </p:par>
                   <p:par>
-                    <p:cTn id="13" fill="hold">
+                    <p:cTn id="15" fill="hold">
                       <p:stCondLst>
                         <p:cond delay="indefinite"/>
                       </p:stCondLst>
                       <p:childTnLst>
                         <p:par>
-                          <p:cTn id="14" fill="hold">
+                          <p:cTn id="16" fill="hold">
                             <p:stCondLst>
                               <p:cond delay="0"/>
                             </p:stCondLst>
                             <p:childTnLst>
                               <p:par>
-                                <p:cTn id="15" presetID="1" presetClass="entr" presetSubtype="0" fill="hold" nodeType="clickEffect">
+                                <p:cTn id="17" presetID="1" presetClass="entr" presetSubtype="0" fill="hold" nodeType="clickEffect">
                                   <p:stCondLst>
                                     <p:cond delay="0"/>
                                   </p:stCondLst>
                                   <p:childTnLst>
                                     <p:set>
                                       <p:cBhvr>
-                                        <p:cTn id="16" dur="1" fill="hold">
+                                        <p:cTn id="18" dur="1" fill="hold">
                                           <p:stCondLst>
                                             <p:cond delay="0"/>
                                           </p:stCondLst>
@@ -7222,34 +7871,7 @@
                                 </p:cTn>
                               </p:par>
                               <p:par>
-                                <p:cTn id="17" presetID="1" presetClass="entr" presetSubtype="0" fill="hold" grpId="0" nodeType="withEffect">
-                                  <p:stCondLst>
-                                    <p:cond delay="0"/>
-                                  </p:stCondLst>
-                                  <p:childTnLst>
-                                    <p:set>
-                                      <p:cBhvr>
-                                        <p:cTn id="18" dur="1" fill="hold">
-                                          <p:stCondLst>
-                                            <p:cond delay="0"/>
-                                          </p:stCondLst>
-                                        </p:cTn>
-                                        <p:tgtEl>
-                                          <p:spTgt spid="14"/>
-                                        </p:tgtEl>
-                                        <p:attrNameLst>
-                                          <p:attrName>style.visibility</p:attrName>
-                                        </p:attrNameLst>
-                                      </p:cBhvr>
-                                      <p:to>
-                                        <p:strVal val="visible"/>
-                                      </p:to>
-                                    </p:set>
-                                  </p:childTnLst>
-                                </p:cTn>
-                              </p:par>
-                              <p:par>
-                                <p:cTn id="19" presetID="1" presetClass="entr" presetSubtype="0" fill="hold" nodeType="withEffect">
+                                <p:cTn id="19" presetID="1" presetClass="entr" presetSubtype="0" fill="hold" grpId="0" nodeType="withEffect">
                                   <p:stCondLst>
                                     <p:cond delay="0"/>
                                   </p:stCondLst>
@@ -7262,7 +7884,7 @@
                                           </p:stCondLst>
                                         </p:cTn>
                                         <p:tgtEl>
-                                          <p:spTgt spid="26"/>
+                                          <p:spTgt spid="14"/>
                                         </p:tgtEl>
                                         <p:attrNameLst>
                                           <p:attrName>style.visibility</p:attrName>
@@ -7289,7 +7911,7 @@
                                           </p:stCondLst>
                                         </p:cTn>
                                         <p:tgtEl>
-                                          <p:spTgt spid="33"/>
+                                          <p:spTgt spid="26"/>
                                         </p:tgtEl>
                                         <p:attrNameLst>
                                           <p:attrName>style.visibility</p:attrName>
@@ -7316,7 +7938,7 @@
                                           </p:stCondLst>
                                         </p:cTn>
                                         <p:tgtEl>
-                                          <p:spTgt spid="28"/>
+                                          <p:spTgt spid="33"/>
                                         </p:tgtEl>
                                         <p:attrNameLst>
                                           <p:attrName>style.visibility</p:attrName>
@@ -7343,6 +7965,33 @@
                                           </p:stCondLst>
                                         </p:cTn>
                                         <p:tgtEl>
+                                          <p:spTgt spid="28"/>
+                                        </p:tgtEl>
+                                        <p:attrNameLst>
+                                          <p:attrName>style.visibility</p:attrName>
+                                        </p:attrNameLst>
+                                      </p:cBhvr>
+                                      <p:to>
+                                        <p:strVal val="visible"/>
+                                      </p:to>
+                                    </p:set>
+                                  </p:childTnLst>
+                                </p:cTn>
+                              </p:par>
+                              <p:par>
+                                <p:cTn id="27" presetID="1" presetClass="entr" presetSubtype="0" fill="hold" nodeType="withEffect">
+                                  <p:stCondLst>
+                                    <p:cond delay="0"/>
+                                  </p:stCondLst>
+                                  <p:childTnLst>
+                                    <p:set>
+                                      <p:cBhvr>
+                                        <p:cTn id="28" dur="1" fill="hold">
+                                          <p:stCondLst>
+                                            <p:cond delay="0"/>
+                                          </p:stCondLst>
+                                        </p:cTn>
+                                        <p:tgtEl>
                                           <p:spTgt spid="7"/>
                                         </p:tgtEl>
                                         <p:attrNameLst>
@@ -7357,14 +8006,14 @@
                                 </p:cTn>
                               </p:par>
                               <p:par>
-                                <p:cTn id="27" presetID="1" presetClass="entr" presetSubtype="0" fill="hold" grpId="0" nodeType="withEffect">
+                                <p:cTn id="29" presetID="1" presetClass="entr" presetSubtype="0" fill="hold" grpId="0" nodeType="withEffect">
                                   <p:stCondLst>
                                     <p:cond delay="0"/>
                                   </p:stCondLst>
                                   <p:childTnLst>
                                     <p:set>
                                       <p:cBhvr>
-                                        <p:cTn id="28" dur="1" fill="hold">
+                                        <p:cTn id="30" dur="1" fill="hold">
                                           <p:stCondLst>
                                             <p:cond delay="0"/>
                                           </p:stCondLst>
@@ -7390,46 +8039,19 @@
                     </p:cTn>
                   </p:par>
                   <p:par>
-                    <p:cTn id="29" fill="hold">
+                    <p:cTn id="31" fill="hold">
                       <p:stCondLst>
                         <p:cond delay="indefinite"/>
                       </p:stCondLst>
                       <p:childTnLst>
                         <p:par>
-                          <p:cTn id="30" fill="hold">
+                          <p:cTn id="32" fill="hold">
                             <p:stCondLst>
                               <p:cond delay="0"/>
                             </p:stCondLst>
                             <p:childTnLst>
                               <p:par>
-                                <p:cTn id="31" presetID="1" presetClass="entr" presetSubtype="0" fill="hold" grpId="0" nodeType="clickEffect">
-                                  <p:stCondLst>
-                                    <p:cond delay="0"/>
-                                  </p:stCondLst>
-                                  <p:childTnLst>
-                                    <p:set>
-                                      <p:cBhvr>
-                                        <p:cTn id="32" dur="1" fill="hold">
-                                          <p:stCondLst>
-                                            <p:cond delay="0"/>
-                                          </p:stCondLst>
-                                        </p:cTn>
-                                        <p:tgtEl>
-                                          <p:spTgt spid="16"/>
-                                        </p:tgtEl>
-                                        <p:attrNameLst>
-                                          <p:attrName>style.visibility</p:attrName>
-                                        </p:attrNameLst>
-                                      </p:cBhvr>
-                                      <p:to>
-                                        <p:strVal val="visible"/>
-                                      </p:to>
-                                    </p:set>
-                                  </p:childTnLst>
-                                </p:cTn>
-                              </p:par>
-                              <p:par>
-                                <p:cTn id="33" presetID="1" presetClass="entr" presetSubtype="0" fill="hold" nodeType="withEffect">
+                                <p:cTn id="33" presetID="1" presetClass="entr" presetSubtype="0" fill="hold" grpId="0" nodeType="clickEffect">
                                   <p:stCondLst>
                                     <p:cond delay="0"/>
                                   </p:stCondLst>
@@ -7442,7 +8064,7 @@
                                           </p:stCondLst>
                                         </p:cTn>
                                         <p:tgtEl>
-                                          <p:spTgt spid="6"/>
+                                          <p:spTgt spid="16"/>
                                         </p:tgtEl>
                                         <p:attrNameLst>
                                           <p:attrName>style.visibility</p:attrName>
@@ -7469,6 +8091,33 @@
                                           </p:stCondLst>
                                         </p:cTn>
                                         <p:tgtEl>
+                                          <p:spTgt spid="6"/>
+                                        </p:tgtEl>
+                                        <p:attrNameLst>
+                                          <p:attrName>style.visibility</p:attrName>
+                                        </p:attrNameLst>
+                                      </p:cBhvr>
+                                      <p:to>
+                                        <p:strVal val="visible"/>
+                                      </p:to>
+                                    </p:set>
+                                  </p:childTnLst>
+                                </p:cTn>
+                              </p:par>
+                              <p:par>
+                                <p:cTn id="37" presetID="1" presetClass="entr" presetSubtype="0" fill="hold" nodeType="withEffect">
+                                  <p:stCondLst>
+                                    <p:cond delay="0"/>
+                                  </p:stCondLst>
+                                  <p:childTnLst>
+                                    <p:set>
+                                      <p:cBhvr>
+                                        <p:cTn id="38" dur="1" fill="hold">
+                                          <p:stCondLst>
+                                            <p:cond delay="0"/>
+                                          </p:stCondLst>
+                                        </p:cTn>
+                                        <p:tgtEl>
                                           <p:spTgt spid="52"/>
                                         </p:tgtEl>
                                         <p:attrNameLst>
@@ -7483,14 +8132,14 @@
                                 </p:cTn>
                               </p:par>
                               <p:par>
-                                <p:cTn id="37" presetID="1" presetClass="entr" presetSubtype="0" fill="hold" grpId="0" nodeType="withEffect">
+                                <p:cTn id="39" presetID="1" presetClass="entr" presetSubtype="0" fill="hold" grpId="0" nodeType="withEffect">
                                   <p:stCondLst>
                                     <p:cond delay="0"/>
                                   </p:stCondLst>
                                   <p:childTnLst>
                                     <p:set>
                                       <p:cBhvr>
-                                        <p:cTn id="38" dur="1" fill="hold">
+                                        <p:cTn id="40" dur="1" fill="hold">
                                           <p:stCondLst>
                                             <p:cond delay="0"/>
                                           </p:stCondLst>
@@ -7510,34 +8159,7 @@
                                 </p:cTn>
                               </p:par>
                               <p:par>
-                                <p:cTn id="39" presetID="1" presetClass="entr" presetSubtype="0" fill="hold" nodeType="withEffect">
-                                  <p:stCondLst>
-                                    <p:cond delay="0"/>
-                                  </p:stCondLst>
-                                  <p:childTnLst>
-                                    <p:set>
-                                      <p:cBhvr>
-                                        <p:cTn id="40" dur="1" fill="hold">
-                                          <p:stCondLst>
-                                            <p:cond delay="0"/>
-                                          </p:stCondLst>
-                                        </p:cTn>
-                                        <p:tgtEl>
-                                          <p:spTgt spid="54"/>
-                                        </p:tgtEl>
-                                        <p:attrNameLst>
-                                          <p:attrName>style.visibility</p:attrName>
-                                        </p:attrNameLst>
-                                      </p:cBhvr>
-                                      <p:to>
-                                        <p:strVal val="visible"/>
-                                      </p:to>
-                                    </p:set>
-                                  </p:childTnLst>
-                                </p:cTn>
-                              </p:par>
-                              <p:par>
-                                <p:cTn id="41" presetID="1" presetClass="entr" presetSubtype="0" fill="hold" grpId="0" nodeType="withEffect">
+                                <p:cTn id="41" presetID="1" presetClass="entr" presetSubtype="0" fill="hold" nodeType="withEffect">
                                   <p:stCondLst>
                                     <p:cond delay="0"/>
                                   </p:stCondLst>
@@ -7550,7 +8172,7 @@
                                           </p:stCondLst>
                                         </p:cTn>
                                         <p:tgtEl>
-                                          <p:spTgt spid="9"/>
+                                          <p:spTgt spid="54"/>
                                         </p:tgtEl>
                                         <p:attrNameLst>
                                           <p:attrName>style.visibility</p:attrName>
@@ -7572,6 +8194,33 @@
                                     <p:set>
                                       <p:cBhvr>
                                         <p:cTn id="44" dur="1" fill="hold">
+                                          <p:stCondLst>
+                                            <p:cond delay="0"/>
+                                          </p:stCondLst>
+                                        </p:cTn>
+                                        <p:tgtEl>
+                                          <p:spTgt spid="9"/>
+                                        </p:tgtEl>
+                                        <p:attrNameLst>
+                                          <p:attrName>style.visibility</p:attrName>
+                                        </p:attrNameLst>
+                                      </p:cBhvr>
+                                      <p:to>
+                                        <p:strVal val="visible"/>
+                                      </p:to>
+                                    </p:set>
+                                  </p:childTnLst>
+                                </p:cTn>
+                              </p:par>
+                              <p:par>
+                                <p:cTn id="45" presetID="1" presetClass="entr" presetSubtype="0" fill="hold" grpId="0" nodeType="withEffect">
+                                  <p:stCondLst>
+                                    <p:cond delay="0"/>
+                                  </p:stCondLst>
+                                  <p:childTnLst>
+                                    <p:set>
+                                      <p:cBhvr>
+                                        <p:cTn id="46" dur="1" fill="hold">
                                           <p:stCondLst>
                                             <p:cond delay="0"/>
                                           </p:stCondLst>
@@ -7625,6 +8274,7 @@
       <p:bldP spid="9" grpId="0" animBg="1"/>
       <p:bldP spid="17" grpId="0"/>
       <p:bldP spid="24" grpId="0"/>
+      <p:bldP spid="23" grpId="0"/>
     </p:bldLst>
   </p:timing>
 </p:sld>
@@ -7906,7 +8556,7 @@
         </p:nvSpPr>
         <p:spPr>
           <a:xfrm>
-            <a:off x="6449568" y="2369677"/>
+            <a:off x="4283885" y="3669089"/>
             <a:ext cx="4946904" cy="2677656"/>
           </a:xfrm>
           <a:prstGeom prst="rect">
@@ -7931,11 +8581,11 @@
             </a:pPr>
             <a:r>
               <a:rPr lang="de-DE" sz="2800" dirty="0" smtClean="0"/>
-              <a:t>File </a:t>
+              <a:t>File: File1, </a:t>
             </a:r>
             <a:r>
               <a:rPr lang="de-DE" sz="2800" dirty="0" err="1" smtClean="0"/>
-              <a:t>name</a:t>
+              <a:t>chunk</a:t>
             </a:r>
             <a:r>
               <a:rPr lang="de-DE" sz="2800" dirty="0" smtClean="0"/>
@@ -7943,23 +8593,11 @@
             </a:r>
             <a:r>
               <a:rPr lang="de-DE" sz="2800" dirty="0" err="1" smtClean="0"/>
-              <a:t>and</a:t>
+              <a:t>index</a:t>
             </a:r>
             <a:r>
               <a:rPr lang="de-DE" sz="2800" dirty="0" smtClean="0"/>
-              <a:t> </a:t>
-            </a:r>
-            <a:r>
-              <a:rPr lang="de-DE" sz="2800" dirty="0" err="1" smtClean="0"/>
-              <a:t>chunk</a:t>
-            </a:r>
-            <a:r>
-              <a:rPr lang="de-DE" sz="2800" dirty="0" smtClean="0"/>
-              <a:t> </a:t>
-            </a:r>
-            <a:r>
-              <a:rPr lang="de-DE" sz="2800" dirty="0" err="1" smtClean="0"/>
-              <a:t>index</a:t>
+              <a:t>: 3</a:t>
             </a:r>
             <a:endParaRPr lang="de-DE" sz="2800" dirty="0" smtClean="0"/>
           </a:p>
@@ -7973,19 +8611,15 @@
             </a:r>
             <a:r>
               <a:rPr lang="de-DE" sz="2800" dirty="0" smtClean="0"/>
-              <a:t> handle </a:t>
-            </a:r>
-            <a:r>
-              <a:rPr lang="de-DE" sz="2800" dirty="0" err="1" smtClean="0"/>
-              <a:t>and</a:t>
-            </a:r>
-            <a:r>
-              <a:rPr lang="de-DE" sz="2800" dirty="0" smtClean="0"/>
-              <a:t> </a:t>
+              <a:t> d, </a:t>
             </a:r>
             <a:r>
               <a:rPr lang="de-DE" sz="2800" dirty="0" err="1" smtClean="0"/>
               <a:t>location</a:t>
+            </a:r>
+            <a:r>
+              <a:rPr lang="de-DE" sz="2800" dirty="0" smtClean="0"/>
+              <a:t>: CS 1, CS 2</a:t>
             </a:r>
             <a:endParaRPr lang="de-DE" sz="2800" dirty="0" smtClean="0"/>
           </a:p>
@@ -7999,11 +8633,15 @@
             </a:r>
             <a:r>
               <a:rPr lang="de-DE" sz="2800" dirty="0" smtClean="0"/>
-              <a:t> handle </a:t>
+              <a:t> </a:t>
+            </a:r>
+            <a:r>
+              <a:rPr lang="de-DE" sz="2800" dirty="0" smtClean="0"/>
+              <a:t>d, </a:t>
             </a:r>
             <a:r>
               <a:rPr lang="de-DE" sz="2800" dirty="0" err="1" smtClean="0"/>
-              <a:t>and</a:t>
+              <a:t>byte</a:t>
             </a:r>
             <a:r>
               <a:rPr lang="de-DE" sz="2800" dirty="0" smtClean="0"/>
@@ -8011,17 +8649,16 @@
             </a:r>
             <a:r>
               <a:rPr lang="de-DE" sz="2800" dirty="0" err="1" smtClean="0"/>
-              <a:t>byte</a:t>
+              <a:t>range</a:t>
+            </a:r>
+            <a:r>
+              <a:rPr lang="de-DE" sz="2800" dirty="0"/>
+              <a:t>:</a:t>
             </a:r>
             <a:r>
               <a:rPr lang="de-DE" sz="2800" dirty="0" smtClean="0"/>
-              <a:t> </a:t>
-            </a:r>
-            <a:r>
-              <a:rPr lang="de-DE" sz="2800" dirty="0" err="1" smtClean="0"/>
-              <a:t>range</a:t>
-            </a:r>
-            <a:endParaRPr lang="de-DE" sz="2800" dirty="0" smtClean="0"/>
+              <a:t> 1-1000</a:t>
+            </a:r>
           </a:p>
           <a:p>
             <a:pPr marL="514350" indent="-514350">
@@ -8029,8 +8666,17 @@
             </a:pPr>
             <a:r>
               <a:rPr lang="de-DE" sz="2800" dirty="0" smtClean="0"/>
-              <a:t>Data</a:t>
-            </a:r>
+              <a:t>Data: </a:t>
+            </a:r>
+            <a:r>
+              <a:rPr lang="de-DE" sz="2800" dirty="0" err="1" smtClean="0"/>
+              <a:t>byte</a:t>
+            </a:r>
+            <a:r>
+              <a:rPr lang="de-DE" sz="2800" dirty="0" smtClean="0"/>
+              <a:t> 1-1000</a:t>
+            </a:r>
+            <a:endParaRPr lang="de-DE" sz="2800" dirty="0" smtClean="0"/>
           </a:p>
           <a:p>
             <a:pPr marL="514350" indent="-514350">
@@ -8294,6 +8940,355 @@
               <a:rPr lang="de-DE" dirty="0"/>
               <a:t>4</a:t>
             </a:r>
+          </a:p>
+        </p:txBody>
+      </p:sp>
+      <p:sp>
+        <p:nvSpPr>
+          <p:cNvPr id="20" name="Textfeld 19"/>
+          <p:cNvSpPr txBox="1"/>
+          <p:nvPr/>
+        </p:nvSpPr>
+        <p:spPr>
+          <a:xfrm>
+            <a:off x="7339584" y="3068471"/>
+            <a:ext cx="3340608" cy="1107996"/>
+          </a:xfrm>
+          <a:prstGeom prst="rect">
+            <a:avLst/>
+          </a:prstGeom>
+          <a:noFill/>
+        </p:spPr>
+        <p:txBody>
+          <a:bodyPr wrap="square" rtlCol="0">
+            <a:spAutoFit/>
+          </a:bodyPr>
+          <a:lstStyle/>
+          <a:p>
+            <a:r>
+              <a:rPr lang="de-DE" dirty="0" smtClean="0"/>
+              <a:t>Master</a:t>
+            </a:r>
+          </a:p>
+          <a:p>
+            <a:r>
+              <a:rPr lang="de-DE" sz="1600" dirty="0" smtClean="0"/>
+              <a:t>File1: </a:t>
+            </a:r>
+            <a:r>
+              <a:rPr lang="de-DE" sz="1600" dirty="0" err="1" smtClean="0">
+                <a:solidFill>
+                  <a:schemeClr val="bg2">
+                    <a:lumMod val="75000"/>
+                  </a:schemeClr>
+                </a:solidFill>
+              </a:rPr>
+              <a:t>chunk</a:t>
+            </a:r>
+            <a:r>
+              <a:rPr lang="de-DE" sz="1600" dirty="0" smtClean="0">
+                <a:solidFill>
+                  <a:schemeClr val="bg2">
+                    <a:lumMod val="75000"/>
+                  </a:schemeClr>
+                </a:solidFill>
+              </a:rPr>
+              <a:t> a, </a:t>
+            </a:r>
+            <a:r>
+              <a:rPr lang="de-DE" sz="1600" dirty="0" err="1" smtClean="0">
+                <a:solidFill>
+                  <a:schemeClr val="bg2">
+                    <a:lumMod val="75000"/>
+                  </a:schemeClr>
+                </a:solidFill>
+              </a:rPr>
+              <a:t>chunk</a:t>
+            </a:r>
+            <a:r>
+              <a:rPr lang="de-DE" sz="1600" dirty="0" smtClean="0">
+                <a:solidFill>
+                  <a:schemeClr val="bg2">
+                    <a:lumMod val="75000"/>
+                  </a:schemeClr>
+                </a:solidFill>
+              </a:rPr>
+              <a:t> c, </a:t>
+            </a:r>
+            <a:r>
+              <a:rPr lang="de-DE" sz="1600" dirty="0" err="1" smtClean="0"/>
+              <a:t>chunk</a:t>
+            </a:r>
+            <a:r>
+              <a:rPr lang="de-DE" sz="1600" dirty="0" smtClean="0"/>
+              <a:t> d, …</a:t>
+            </a:r>
+          </a:p>
+          <a:p>
+            <a:r>
+              <a:rPr lang="de-DE" sz="1600" dirty="0" smtClean="0">
+                <a:solidFill>
+                  <a:schemeClr val="bg2"/>
+                </a:solidFill>
+              </a:rPr>
+              <a:t>File2: </a:t>
+            </a:r>
+            <a:r>
+              <a:rPr lang="de-DE" sz="1600" dirty="0" err="1" smtClean="0">
+                <a:solidFill>
+                  <a:schemeClr val="bg2"/>
+                </a:solidFill>
+              </a:rPr>
+              <a:t>chunk</a:t>
+            </a:r>
+            <a:r>
+              <a:rPr lang="de-DE" sz="1600" dirty="0" smtClean="0">
+                <a:solidFill>
+                  <a:schemeClr val="bg2"/>
+                </a:solidFill>
+              </a:rPr>
+              <a:t> b, </a:t>
+            </a:r>
+            <a:r>
+              <a:rPr lang="de-DE" sz="1600" dirty="0" err="1" smtClean="0">
+                <a:solidFill>
+                  <a:schemeClr val="bg2"/>
+                </a:solidFill>
+              </a:rPr>
+              <a:t>chunk</a:t>
+            </a:r>
+            <a:r>
+              <a:rPr lang="de-DE" sz="1600" dirty="0" smtClean="0">
+                <a:solidFill>
+                  <a:schemeClr val="bg2"/>
+                </a:solidFill>
+              </a:rPr>
+              <a:t> x</a:t>
+            </a:r>
+          </a:p>
+          <a:p>
+            <a:r>
+              <a:rPr lang="de-DE" sz="1600" dirty="0" smtClean="0">
+                <a:solidFill>
+                  <a:schemeClr val="bg2"/>
+                </a:solidFill>
+              </a:rPr>
+              <a:t>…</a:t>
+            </a:r>
+            <a:endParaRPr lang="de-DE" sz="1600" dirty="0">
+              <a:solidFill>
+                <a:schemeClr val="bg2"/>
+              </a:solidFill>
+            </a:endParaRPr>
+          </a:p>
+        </p:txBody>
+      </p:sp>
+      <p:sp>
+        <p:nvSpPr>
+          <p:cNvPr id="22" name="Textfeld 21"/>
+          <p:cNvSpPr txBox="1"/>
+          <p:nvPr/>
+        </p:nvSpPr>
+        <p:spPr>
+          <a:xfrm>
+            <a:off x="7339584" y="1719755"/>
+            <a:ext cx="1554480" cy="1631216"/>
+          </a:xfrm>
+          <a:prstGeom prst="rect">
+            <a:avLst/>
+          </a:prstGeom>
+          <a:noFill/>
+        </p:spPr>
+        <p:txBody>
+          <a:bodyPr wrap="square" rtlCol="0">
+            <a:spAutoFit/>
+          </a:bodyPr>
+          <a:lstStyle/>
+          <a:p>
+            <a:r>
+              <a:rPr lang="de-DE" dirty="0" smtClean="0"/>
+              <a:t>CS 1</a:t>
+            </a:r>
+            <a:endParaRPr lang="de-DE" dirty="0" smtClean="0"/>
+          </a:p>
+          <a:p>
+            <a:r>
+              <a:rPr lang="de-DE" sz="1600" dirty="0" err="1" smtClean="0">
+                <a:solidFill>
+                  <a:schemeClr val="bg2"/>
+                </a:solidFill>
+              </a:rPr>
+              <a:t>Chunk</a:t>
+            </a:r>
+            <a:r>
+              <a:rPr lang="de-DE" sz="1600" dirty="0" smtClean="0">
+                <a:solidFill>
+                  <a:schemeClr val="bg2"/>
+                </a:solidFill>
+              </a:rPr>
+              <a:t> a</a:t>
+            </a:r>
+          </a:p>
+          <a:p>
+            <a:r>
+              <a:rPr lang="de-DE" sz="1600" b="1" dirty="0" err="1" smtClean="0"/>
+              <a:t>Chunk</a:t>
+            </a:r>
+            <a:r>
+              <a:rPr lang="de-DE" sz="1600" b="1" dirty="0" smtClean="0"/>
+              <a:t> d</a:t>
+            </a:r>
+          </a:p>
+          <a:p>
+            <a:r>
+              <a:rPr lang="de-DE" sz="1600" dirty="0" err="1" smtClean="0">
+                <a:solidFill>
+                  <a:schemeClr val="bg2"/>
+                </a:solidFill>
+              </a:rPr>
+              <a:t>Chunk</a:t>
+            </a:r>
+            <a:r>
+              <a:rPr lang="de-DE" sz="1600" dirty="0" smtClean="0">
+                <a:solidFill>
+                  <a:schemeClr val="bg2"/>
+                </a:solidFill>
+              </a:rPr>
+              <a:t> k</a:t>
+            </a:r>
+          </a:p>
+          <a:p>
+            <a:r>
+              <a:rPr lang="de-DE" sz="1600" dirty="0" smtClean="0">
+                <a:solidFill>
+                  <a:schemeClr val="bg2"/>
+                </a:solidFill>
+              </a:rPr>
+              <a:t>…</a:t>
+            </a:r>
+          </a:p>
+          <a:p>
+            <a:endParaRPr lang="de-DE" dirty="0"/>
+          </a:p>
+        </p:txBody>
+      </p:sp>
+      <p:sp>
+        <p:nvSpPr>
+          <p:cNvPr id="23" name="Textfeld 22"/>
+          <p:cNvSpPr txBox="1"/>
+          <p:nvPr/>
+        </p:nvSpPr>
+        <p:spPr>
+          <a:xfrm>
+            <a:off x="8990316" y="1722772"/>
+            <a:ext cx="1839228" cy="1631216"/>
+          </a:xfrm>
+          <a:prstGeom prst="rect">
+            <a:avLst/>
+          </a:prstGeom>
+          <a:noFill/>
+        </p:spPr>
+        <p:txBody>
+          <a:bodyPr wrap="square" rtlCol="0">
+            <a:spAutoFit/>
+          </a:bodyPr>
+          <a:lstStyle/>
+          <a:p>
+            <a:r>
+              <a:rPr lang="de-DE" dirty="0" smtClean="0"/>
+              <a:t>CS 2</a:t>
+            </a:r>
+            <a:endParaRPr lang="de-DE" dirty="0" smtClean="0"/>
+          </a:p>
+          <a:p>
+            <a:r>
+              <a:rPr lang="de-DE" sz="1600" dirty="0" err="1" smtClean="0">
+                <a:solidFill>
+                  <a:schemeClr val="bg2"/>
+                </a:solidFill>
+              </a:rPr>
+              <a:t>Chunk</a:t>
+            </a:r>
+            <a:r>
+              <a:rPr lang="de-DE" sz="1600" dirty="0" smtClean="0">
+                <a:solidFill>
+                  <a:schemeClr val="bg2"/>
+                </a:solidFill>
+              </a:rPr>
+              <a:t> </a:t>
+            </a:r>
+            <a:r>
+              <a:rPr lang="de-DE" sz="1600" dirty="0" smtClean="0">
+                <a:solidFill>
+                  <a:schemeClr val="bg2"/>
+                </a:solidFill>
+              </a:rPr>
+              <a:t>b</a:t>
+            </a:r>
+            <a:endParaRPr lang="de-DE" sz="1600" dirty="0" smtClean="0">
+              <a:solidFill>
+                <a:schemeClr val="bg2"/>
+              </a:solidFill>
+            </a:endParaRPr>
+          </a:p>
+          <a:p>
+            <a:r>
+              <a:rPr lang="de-DE" sz="1600" b="1" dirty="0" err="1" smtClean="0"/>
+              <a:t>Chunk</a:t>
+            </a:r>
+            <a:r>
+              <a:rPr lang="de-DE" sz="1600" b="1" dirty="0" smtClean="0"/>
+              <a:t> </a:t>
+            </a:r>
+            <a:r>
+              <a:rPr lang="de-DE" sz="1600" b="1" dirty="0"/>
+              <a:t>d</a:t>
+            </a:r>
+            <a:endParaRPr lang="de-DE" sz="1600" b="1" dirty="0" smtClean="0"/>
+          </a:p>
+          <a:p>
+            <a:r>
+              <a:rPr lang="de-DE" sz="1600" dirty="0" err="1" smtClean="0">
+                <a:solidFill>
+                  <a:schemeClr val="bg2"/>
+                </a:solidFill>
+              </a:rPr>
+              <a:t>Chunk</a:t>
+            </a:r>
+            <a:r>
+              <a:rPr lang="de-DE" sz="1600" dirty="0" smtClean="0">
+                <a:solidFill>
+                  <a:schemeClr val="bg2"/>
+                </a:solidFill>
+              </a:rPr>
+              <a:t> </a:t>
+            </a:r>
+            <a:r>
+              <a:rPr lang="de-DE" sz="1600" dirty="0">
+                <a:solidFill>
+                  <a:schemeClr val="bg2"/>
+                </a:solidFill>
+              </a:rPr>
+              <a:t>e</a:t>
+            </a:r>
+            <a:endParaRPr lang="de-DE" sz="1600" dirty="0" smtClean="0">
+              <a:solidFill>
+                <a:schemeClr val="bg2"/>
+              </a:solidFill>
+            </a:endParaRPr>
+          </a:p>
+          <a:p>
+            <a:r>
+              <a:rPr lang="de-DE" sz="1600" dirty="0" smtClean="0">
+                <a:solidFill>
+                  <a:schemeClr val="bg2"/>
+                </a:solidFill>
+              </a:rPr>
+              <a:t>…</a:t>
+            </a:r>
+          </a:p>
+          <a:p>
+            <a:endParaRPr lang="de-DE" dirty="0"/>
           </a:p>
         </p:txBody>
       </p:sp>

</xml_diff>